<commit_message>
added implementation of suffix tree in C
</commit_message>
<xml_diff>
--- a/slides/persian/Suffix Tree.pptx
+++ b/slides/persian/Suffix Tree.pptx
@@ -16,11 +16,12 @@
     <p:sldId id="265" r:id="rId10"/>
     <p:sldId id="266" r:id="rId11"/>
     <p:sldId id="267" r:id="rId12"/>
-    <p:sldId id="278" r:id="rId13"/>
-    <p:sldId id="270" r:id="rId14"/>
-    <p:sldId id="274" r:id="rId15"/>
-    <p:sldId id="272" r:id="rId16"/>
-    <p:sldId id="276" r:id="rId17"/>
+    <p:sldId id="279" r:id="rId13"/>
+    <p:sldId id="278" r:id="rId14"/>
+    <p:sldId id="270" r:id="rId15"/>
+    <p:sldId id="274" r:id="rId16"/>
+    <p:sldId id="272" r:id="rId17"/>
+    <p:sldId id="276" r:id="rId18"/>
   </p:sldIdLst>
   <p:sldSz cx="12192000" cy="6858000"/>
   <p:notesSz cx="6858000" cy="9144000"/>
@@ -139,6 +140,7 @@
             <p14:sldId id="265"/>
             <p14:sldId id="266"/>
             <p14:sldId id="267"/>
+            <p14:sldId id="279"/>
             <p14:sldId id="278"/>
             <p14:sldId id="270"/>
             <p14:sldId id="274"/>
@@ -795,7 +797,7 @@
           <a:p>
             <a:fld id="{EA636227-4E37-4851-ADCE-8B8AC33C39BB}" type="datetimeFigureOut">
               <a:rPr lang="en-US" smtClean="0"/>
-              <a:t>12/17/2021</a:t>
+              <a:t>12/23/2021</a:t>
             </a:fld>
             <a:endParaRPr lang="en-US"/>
           </a:p>
@@ -1003,7 +1005,7 @@
           <a:p>
             <a:fld id="{EA636227-4E37-4851-ADCE-8B8AC33C39BB}" type="datetimeFigureOut">
               <a:rPr lang="en-US" smtClean="0"/>
-              <a:t>12/17/2021</a:t>
+              <a:t>12/23/2021</a:t>
             </a:fld>
             <a:endParaRPr lang="en-US"/>
           </a:p>
@@ -1259,7 +1261,7 @@
           <a:p>
             <a:fld id="{EA636227-4E37-4851-ADCE-8B8AC33C39BB}" type="datetimeFigureOut">
               <a:rPr lang="en-US" smtClean="0"/>
-              <a:t>12/17/2021</a:t>
+              <a:t>12/23/2021</a:t>
             </a:fld>
             <a:endParaRPr lang="en-US"/>
           </a:p>
@@ -1429,7 +1431,7 @@
           <a:p>
             <a:fld id="{EA636227-4E37-4851-ADCE-8B8AC33C39BB}" type="datetimeFigureOut">
               <a:rPr lang="en-US" smtClean="0"/>
-              <a:t>12/17/2021</a:t>
+              <a:t>12/23/2021</a:t>
             </a:fld>
             <a:endParaRPr lang="en-US"/>
           </a:p>
@@ -1772,7 +1774,7 @@
           <a:p>
             <a:fld id="{EA636227-4E37-4851-ADCE-8B8AC33C39BB}" type="datetimeFigureOut">
               <a:rPr lang="en-US" smtClean="0"/>
-              <a:t>12/17/2021</a:t>
+              <a:t>12/23/2021</a:t>
             </a:fld>
             <a:endParaRPr lang="en-US"/>
           </a:p>
@@ -2047,7 +2049,7 @@
           <a:p>
             <a:fld id="{EA636227-4E37-4851-ADCE-8B8AC33C39BB}" type="datetimeFigureOut">
               <a:rPr lang="en-US" smtClean="0"/>
-              <a:t>12/17/2021</a:t>
+              <a:t>12/23/2021</a:t>
             </a:fld>
             <a:endParaRPr lang="en-US"/>
           </a:p>
@@ -2426,7 +2428,7 @@
           <a:p>
             <a:fld id="{EA636227-4E37-4851-ADCE-8B8AC33C39BB}" type="datetimeFigureOut">
               <a:rPr lang="en-US" smtClean="0"/>
-              <a:t>12/17/2021</a:t>
+              <a:t>12/23/2021</a:t>
             </a:fld>
             <a:endParaRPr lang="en-US"/>
           </a:p>
@@ -2544,7 +2546,7 @@
           <a:p>
             <a:fld id="{EA636227-4E37-4851-ADCE-8B8AC33C39BB}" type="datetimeFigureOut">
               <a:rPr lang="en-US" smtClean="0"/>
-              <a:t>12/17/2021</a:t>
+              <a:t>12/23/2021</a:t>
             </a:fld>
             <a:endParaRPr lang="en-US"/>
           </a:p>
@@ -2715,7 +2717,7 @@
           <a:p>
             <a:fld id="{EA636227-4E37-4851-ADCE-8B8AC33C39BB}" type="datetimeFigureOut">
               <a:rPr lang="en-US" smtClean="0"/>
-              <a:t>12/17/2021</a:t>
+              <a:t>12/23/2021</a:t>
             </a:fld>
             <a:endParaRPr lang="en-US"/>
           </a:p>
@@ -3069,7 +3071,7 @@
           <a:p>
             <a:fld id="{EA636227-4E37-4851-ADCE-8B8AC33C39BB}" type="datetimeFigureOut">
               <a:rPr lang="en-US" smtClean="0"/>
-              <a:t>12/17/2021</a:t>
+              <a:t>12/23/2021</a:t>
             </a:fld>
             <a:endParaRPr lang="en-US"/>
           </a:p>
@@ -3446,7 +3448,7 @@
           <a:p>
             <a:fld id="{EA636227-4E37-4851-ADCE-8B8AC33C39BB}" type="datetimeFigureOut">
               <a:rPr lang="en-US" smtClean="0"/>
-              <a:t>12/17/2021</a:t>
+              <a:t>12/23/2021</a:t>
             </a:fld>
             <a:endParaRPr lang="en-US"/>
           </a:p>
@@ -3733,7 +3735,7 @@
           <a:p>
             <a:fld id="{EA636227-4E37-4851-ADCE-8B8AC33C39BB}" type="datetimeFigureOut">
               <a:rPr lang="en-US" smtClean="0"/>
-              <a:t>12/17/2021</a:t>
+              <a:t>12/23/2021</a:t>
             </a:fld>
             <a:endParaRPr lang="en-US"/>
           </a:p>
@@ -4647,7 +4649,7 @@
           <a:graphicData uri="http://schemas.openxmlformats.org/presentationml/2006/ole">
             <mc:AlternateContent xmlns:mc="http://schemas.openxmlformats.org/markup-compatibility/2006">
               <mc:Choice xmlns:v="urn:schemas-microsoft-com:vml" Requires="v">
-                <p:oleObj spid="_x0000_s5233" name="Equation" r:id="rId4" imgW="833734" imgH="343211" progId="Equation.DSMT4">
+                <p:oleObj spid="_x0000_s5248" name="Equation" r:id="rId4" imgW="833734" imgH="343211" progId="Equation.DSMT4">
                   <p:embed/>
                 </p:oleObj>
               </mc:Choice>
@@ -4710,7 +4712,7 @@
           <a:graphicData uri="http://schemas.openxmlformats.org/presentationml/2006/ole">
             <mc:AlternateContent xmlns:mc="http://schemas.openxmlformats.org/markup-compatibility/2006">
               <mc:Choice xmlns:v="urn:schemas-microsoft-com:vml" Requires="v">
-                <p:oleObj spid="_x0000_s5234" name="Equation" r:id="rId6" imgW="520560" imgH="177480" progId="Equation.DSMT4">
+                <p:oleObj spid="_x0000_s5249" name="Equation" r:id="rId6" imgW="520560" imgH="177480" progId="Equation.DSMT4">
                   <p:embed/>
                 </p:oleObj>
               </mc:Choice>
@@ -4773,7 +4775,7 @@
           <a:graphicData uri="http://schemas.openxmlformats.org/presentationml/2006/ole">
             <mc:AlternateContent xmlns:mc="http://schemas.openxmlformats.org/markup-compatibility/2006">
               <mc:Choice xmlns:v="urn:schemas-microsoft-com:vml" Requires="v">
-                <p:oleObj spid="_x0000_s5235" name="Equation" r:id="rId8" imgW="596880" imgH="177480" progId="Equation.DSMT4">
+                <p:oleObj spid="_x0000_s5250" name="Equation" r:id="rId8" imgW="596880" imgH="177480" progId="Equation.DSMT4">
                   <p:embed/>
                 </p:oleObj>
               </mc:Choice>
@@ -5115,7 +5117,7 @@
           <a:graphicData uri="http://schemas.openxmlformats.org/presentationml/2006/ole">
             <mc:AlternateContent xmlns:mc="http://schemas.openxmlformats.org/markup-compatibility/2006">
               <mc:Choice xmlns:v="urn:schemas-microsoft-com:vml" Requires="v">
-                <p:oleObj spid="_x0000_s6429" name="Equation" r:id="rId3" imgW="139680" imgH="228600" progId="Equation.DSMT4">
+                <p:oleObj spid="_x0000_s6479" name="Equation" r:id="rId3" imgW="139680" imgH="228600" progId="Equation.DSMT4">
                   <p:embed/>
                 </p:oleObj>
               </mc:Choice>
@@ -5178,7 +5180,7 @@
           <a:graphicData uri="http://schemas.openxmlformats.org/presentationml/2006/ole">
             <mc:AlternateContent xmlns:mc="http://schemas.openxmlformats.org/markup-compatibility/2006">
               <mc:Choice xmlns:v="urn:schemas-microsoft-com:vml" Requires="v">
-                <p:oleObj spid="_x0000_s6430" name="Equation" r:id="rId5" imgW="533160" imgH="203040" progId="Equation.DSMT4">
+                <p:oleObj spid="_x0000_s6480" name="Equation" r:id="rId5" imgW="533160" imgH="203040" progId="Equation.DSMT4">
                   <p:embed/>
                 </p:oleObj>
               </mc:Choice>
@@ -5241,7 +5243,7 @@
           <a:graphicData uri="http://schemas.openxmlformats.org/presentationml/2006/ole">
             <mc:AlternateContent xmlns:mc="http://schemas.openxmlformats.org/markup-compatibility/2006">
               <mc:Choice xmlns:v="urn:schemas-microsoft-com:vml" Requires="v">
-                <p:oleObj spid="_x0000_s6431" name="Equation" r:id="rId7" imgW="228600" imgH="228600" progId="Equation.DSMT4">
+                <p:oleObj spid="_x0000_s6481" name="Equation" r:id="rId7" imgW="228600" imgH="228600" progId="Equation.DSMT4">
                   <p:embed/>
                 </p:oleObj>
               </mc:Choice>
@@ -5304,7 +5306,7 @@
           <a:graphicData uri="http://schemas.openxmlformats.org/presentationml/2006/ole">
             <mc:AlternateContent xmlns:mc="http://schemas.openxmlformats.org/markup-compatibility/2006">
               <mc:Choice xmlns:v="urn:schemas-microsoft-com:vml" Requires="v">
-                <p:oleObj spid="_x0000_s6432" name="Equation" r:id="rId9" imgW="280670" imgH="457495" progId="Equation.DSMT4">
+                <p:oleObj spid="_x0000_s6482" name="Equation" r:id="rId9" imgW="280670" imgH="457495" progId="Equation.DSMT4">
                   <p:embed/>
                 </p:oleObj>
               </mc:Choice>
@@ -5367,7 +5369,7 @@
           <a:graphicData uri="http://schemas.openxmlformats.org/presentationml/2006/ole">
             <mc:AlternateContent xmlns:mc="http://schemas.openxmlformats.org/markup-compatibility/2006">
               <mc:Choice xmlns:v="urn:schemas-microsoft-com:vml" Requires="v">
-                <p:oleObj spid="_x0000_s6433" name="Equation" r:id="rId11" imgW="177480" imgH="228600" progId="Equation.DSMT4">
+                <p:oleObj spid="_x0000_s6483" name="Equation" r:id="rId11" imgW="177480" imgH="228600" progId="Equation.DSMT4">
                   <p:embed/>
                 </p:oleObj>
               </mc:Choice>
@@ -5430,7 +5432,7 @@
           <a:graphicData uri="http://schemas.openxmlformats.org/presentationml/2006/ole">
             <mc:AlternateContent xmlns:mc="http://schemas.openxmlformats.org/markup-compatibility/2006">
               <mc:Choice xmlns:v="urn:schemas-microsoft-com:vml" Requires="v">
-                <p:oleObj spid="_x0000_s6434" name="Equation" r:id="rId13" imgW="139680" imgH="177480" progId="Equation.DSMT4">
+                <p:oleObj spid="_x0000_s6484" name="Equation" r:id="rId13" imgW="139680" imgH="177480" progId="Equation.DSMT4">
                   <p:embed/>
                 </p:oleObj>
               </mc:Choice>
@@ -5493,7 +5495,7 @@
           <a:graphicData uri="http://schemas.openxmlformats.org/presentationml/2006/ole">
             <mc:AlternateContent xmlns:mc="http://schemas.openxmlformats.org/markup-compatibility/2006">
               <mc:Choice xmlns:v="urn:schemas-microsoft-com:vml" Requires="v">
-                <p:oleObj spid="_x0000_s6435" name="Equation" r:id="rId15" imgW="126720" imgH="190440" progId="Equation.DSMT4">
+                <p:oleObj spid="_x0000_s6485" name="Equation" r:id="rId15" imgW="126720" imgH="190440" progId="Equation.DSMT4">
                   <p:embed/>
                 </p:oleObj>
               </mc:Choice>
@@ -5556,7 +5558,7 @@
           <a:graphicData uri="http://schemas.openxmlformats.org/presentationml/2006/ole">
             <mc:AlternateContent xmlns:mc="http://schemas.openxmlformats.org/markup-compatibility/2006">
               <mc:Choice xmlns:v="urn:schemas-microsoft-com:vml" Requires="v">
-                <p:oleObj spid="_x0000_s6436" name="Equation" r:id="rId17" imgW="279360" imgH="177480" progId="Equation.DSMT4">
+                <p:oleObj spid="_x0000_s6486" name="Equation" r:id="rId17" imgW="279360" imgH="177480" progId="Equation.DSMT4">
                   <p:embed/>
                 </p:oleObj>
               </mc:Choice>
@@ -5619,7 +5621,7 @@
           <a:graphicData uri="http://schemas.openxmlformats.org/presentationml/2006/ole">
             <mc:AlternateContent xmlns:mc="http://schemas.openxmlformats.org/markup-compatibility/2006">
               <mc:Choice xmlns:v="urn:schemas-microsoft-com:vml" Requires="v">
-                <p:oleObj spid="_x0000_s6437" name="Equation" r:id="rId19" imgW="571320" imgH="203040" progId="Equation.DSMT4">
+                <p:oleObj spid="_x0000_s6487" name="Equation" r:id="rId19" imgW="571320" imgH="203040" progId="Equation.DSMT4">
                   <p:embed/>
                 </p:oleObj>
               </mc:Choice>
@@ -5682,7 +5684,7 @@
           <a:graphicData uri="http://schemas.openxmlformats.org/presentationml/2006/ole">
             <mc:AlternateContent xmlns:mc="http://schemas.openxmlformats.org/markup-compatibility/2006">
               <mc:Choice xmlns:v="urn:schemas-microsoft-com:vml" Requires="v">
-                <p:oleObj spid="_x0000_s6438" name="Equation" r:id="rId21" imgW="469800" imgH="203040" progId="Equation.DSMT4">
+                <p:oleObj spid="_x0000_s6488" name="Equation" r:id="rId21" imgW="469800" imgH="203040" progId="Equation.DSMT4">
                   <p:embed/>
                 </p:oleObj>
               </mc:Choice>
@@ -5779,6 +5781,203 @@
 </file>
 
 <file path=ppt/slides/slide12.xml><?xml version="1.0" encoding="utf-8"?>
+<p:sld xmlns:a="http://schemas.openxmlformats.org/drawingml/2006/main" xmlns:r="http://schemas.openxmlformats.org/officeDocument/2006/relationships" xmlns:p="http://schemas.openxmlformats.org/presentationml/2006/main">
+  <p:cSld>
+    <p:spTree>
+      <p:nvGrpSpPr>
+        <p:cNvPr id="1" name=""/>
+        <p:cNvGrpSpPr/>
+        <p:nvPr/>
+      </p:nvGrpSpPr>
+      <p:grpSpPr>
+        <a:xfrm>
+          <a:off x="0" y="0"/>
+          <a:ext cx="0" cy="0"/>
+          <a:chOff x="0" y="0"/>
+          <a:chExt cx="0" cy="0"/>
+        </a:xfrm>
+      </p:grpSpPr>
+      <p:sp>
+        <p:nvSpPr>
+          <p:cNvPr id="2" name="Title 1">
+            <a:extLst>
+              <a:ext uri="{FF2B5EF4-FFF2-40B4-BE49-F238E27FC236}">
+                <a16:creationId xmlns:a16="http://schemas.microsoft.com/office/drawing/2014/main" id="{DBB9945F-48AF-4074-A453-59E128038D2C}"/>
+              </a:ext>
+            </a:extLst>
+          </p:cNvPr>
+          <p:cNvSpPr>
+            <a:spLocks noGrp="1"/>
+          </p:cNvSpPr>
+          <p:nvPr>
+            <p:ph type="title"/>
+          </p:nvPr>
+        </p:nvSpPr>
+        <p:spPr>
+          <a:xfrm>
+            <a:off x="1097280" y="286603"/>
+            <a:ext cx="10058400" cy="702303"/>
+          </a:xfrm>
+        </p:spPr>
+        <p:txBody>
+          <a:bodyPr>
+            <a:normAutofit/>
+          </a:bodyPr>
+          <a:lstStyle/>
+          <a:p>
+            <a:r>
+              <a:rPr lang="en-US" sz="3200" dirty="0"/>
+              <a:t>Online Suffix tree Visualizer</a:t>
+            </a:r>
+          </a:p>
+        </p:txBody>
+      </p:sp>
+      <p:sp>
+        <p:nvSpPr>
+          <p:cNvPr id="3" name="Content Placeholder 2">
+            <a:extLst>
+              <a:ext uri="{FF2B5EF4-FFF2-40B4-BE49-F238E27FC236}">
+                <a16:creationId xmlns:a16="http://schemas.microsoft.com/office/drawing/2014/main" id="{BAD111FF-E268-4CE1-AD35-1030244343AD}"/>
+              </a:ext>
+            </a:extLst>
+          </p:cNvPr>
+          <p:cNvSpPr>
+            <a:spLocks noGrp="1"/>
+          </p:cNvSpPr>
+          <p:nvPr>
+            <p:ph idx="1"/>
+          </p:nvPr>
+        </p:nvSpPr>
+        <p:spPr>
+          <a:xfrm>
+            <a:off x="1097280" y="1207363"/>
+            <a:ext cx="10058400" cy="4661731"/>
+          </a:xfrm>
+        </p:spPr>
+        <p:txBody>
+          <a:bodyPr>
+            <a:normAutofit fontScale="92500" lnSpcReduction="10000"/>
+          </a:bodyPr>
+          <a:lstStyle/>
+          <a:p>
+            <a:endParaRPr lang="en-US" sz="1800" dirty="0">
+              <a:hlinkClick r:id="rId2"/>
+            </a:endParaRPr>
+          </a:p>
+          <a:p>
+            <a:endParaRPr lang="en-US" sz="1800" dirty="0">
+              <a:hlinkClick r:id="rId2"/>
+            </a:endParaRPr>
+          </a:p>
+          <a:p>
+            <a:endParaRPr lang="en-US" sz="1800" dirty="0">
+              <a:hlinkClick r:id="rId2"/>
+            </a:endParaRPr>
+          </a:p>
+          <a:p>
+            <a:endParaRPr lang="en-US" sz="1800" dirty="0">
+              <a:hlinkClick r:id="rId2"/>
+            </a:endParaRPr>
+          </a:p>
+          <a:p>
+            <a:endParaRPr lang="en-US" sz="1800" dirty="0">
+              <a:hlinkClick r:id="rId2"/>
+            </a:endParaRPr>
+          </a:p>
+          <a:p>
+            <a:endParaRPr lang="en-US" sz="1800" dirty="0">
+              <a:hlinkClick r:id="rId2"/>
+            </a:endParaRPr>
+          </a:p>
+          <a:p>
+            <a:endParaRPr lang="en-US" sz="1800" dirty="0">
+              <a:hlinkClick r:id="rId2"/>
+            </a:endParaRPr>
+          </a:p>
+          <a:p>
+            <a:endParaRPr lang="en-US" sz="1800" dirty="0">
+              <a:hlinkClick r:id="rId2"/>
+            </a:endParaRPr>
+          </a:p>
+          <a:p>
+            <a:endParaRPr lang="en-US" sz="1800" dirty="0">
+              <a:hlinkClick r:id="rId2"/>
+            </a:endParaRPr>
+          </a:p>
+          <a:p>
+            <a:endParaRPr lang="en-US" sz="1800" dirty="0">
+              <a:hlinkClick r:id="rId2"/>
+            </a:endParaRPr>
+          </a:p>
+          <a:p>
+            <a:endParaRPr lang="en-US" sz="1800" dirty="0">
+              <a:hlinkClick r:id="rId2"/>
+            </a:endParaRPr>
+          </a:p>
+          <a:p>
+            <a:pPr marL="0" indent="0">
+              <a:buNone/>
+            </a:pPr>
+            <a:r>
+              <a:rPr lang="en-US" sz="1800" dirty="0">
+                <a:hlinkClick r:id="rId2"/>
+              </a:rPr>
+              <a:t>https://zamgo.github.io/suffix-tree/website/visualizer/</a:t>
+            </a:r>
+            <a:endParaRPr lang="en-US" sz="1800" dirty="0"/>
+          </a:p>
+        </p:txBody>
+      </p:sp>
+      <p:pic>
+        <p:nvPicPr>
+          <p:cNvPr id="5" name="Picture 4">
+            <a:extLst>
+              <a:ext uri="{FF2B5EF4-FFF2-40B4-BE49-F238E27FC236}">
+                <a16:creationId xmlns:a16="http://schemas.microsoft.com/office/drawing/2014/main" id="{9F9A175F-E8B1-4E29-A738-95D7A264C9B7}"/>
+              </a:ext>
+            </a:extLst>
+          </p:cNvPr>
+          <p:cNvPicPr>
+            <a:picLocks noChangeAspect="1"/>
+          </p:cNvPicPr>
+          <p:nvPr/>
+        </p:nvPicPr>
+        <p:blipFill>
+          <a:blip r:embed="rId3">
+            <a:extLst>
+              <a:ext uri="{28A0092B-C50C-407E-A947-70E740481C1C}">
+                <a14:useLocalDpi xmlns:a14="http://schemas.microsoft.com/office/drawing/2010/main" val="0"/>
+              </a:ext>
+            </a:extLst>
+          </a:blip>
+          <a:stretch>
+            <a:fillRect/>
+          </a:stretch>
+        </p:blipFill>
+        <p:spPr>
+          <a:xfrm>
+            <a:off x="1036320" y="1015539"/>
+            <a:ext cx="9308823" cy="4373207"/>
+          </a:xfrm>
+          <a:prstGeom prst="rect">
+            <a:avLst/>
+          </a:prstGeom>
+        </p:spPr>
+      </p:pic>
+    </p:spTree>
+    <p:extLst>
+      <p:ext uri="{BB962C8B-B14F-4D97-AF65-F5344CB8AC3E}">
+        <p14:creationId xmlns:p14="http://schemas.microsoft.com/office/powerpoint/2010/main" val="2267840638"/>
+      </p:ext>
+    </p:extLst>
+  </p:cSld>
+  <p:clrMapOvr>
+    <a:masterClrMapping/>
+  </p:clrMapOvr>
+</p:sld>
+</file>
+
+<file path=ppt/slides/slide13.xml><?xml version="1.0" encoding="utf-8"?>
 <p:sld xmlns:a="http://schemas.openxmlformats.org/drawingml/2006/main" xmlns:r="http://schemas.openxmlformats.org/officeDocument/2006/relationships" xmlns:p="http://schemas.openxmlformats.org/presentationml/2006/main">
   <p:cSld>
     <p:spTree>
@@ -6063,2061 +6262,6 @@
   <p:clrMapOvr>
     <a:masterClrMapping/>
   </p:clrMapOvr>
-  <mc:AlternateContent xmlns:mc="http://schemas.openxmlformats.org/markup-compatibility/2006">
-    <mc:Choice xmlns:p14="http://schemas.microsoft.com/office/powerpoint/2010/main" Requires="p14">
-      <p:transition spd="med" p14:dur="700">
-        <p:fade/>
-      </p:transition>
-    </mc:Choice>
-    <mc:Fallback>
-      <p:transition spd="med">
-        <p:fade/>
-      </p:transition>
-    </mc:Fallback>
-  </mc:AlternateContent>
-</p:sld>
-</file>
-
-<file path=ppt/slides/slide13.xml><?xml version="1.0" encoding="utf-8"?>
-<p:sld xmlns:a="http://schemas.openxmlformats.org/drawingml/2006/main" xmlns:r="http://schemas.openxmlformats.org/officeDocument/2006/relationships" xmlns:p="http://schemas.openxmlformats.org/presentationml/2006/main">
-  <p:cSld>
-    <p:spTree>
-      <p:nvGrpSpPr>
-        <p:cNvPr id="1" name=""/>
-        <p:cNvGrpSpPr/>
-        <p:nvPr/>
-      </p:nvGrpSpPr>
-      <p:grpSpPr>
-        <a:xfrm>
-          <a:off x="0" y="0"/>
-          <a:ext cx="0" cy="0"/>
-          <a:chOff x="0" y="0"/>
-          <a:chExt cx="0" cy="0"/>
-        </a:xfrm>
-      </p:grpSpPr>
-      <p:sp>
-        <p:nvSpPr>
-          <p:cNvPr id="2" name="Title 1"/>
-          <p:cNvSpPr>
-            <a:spLocks noGrp="1"/>
-          </p:cNvSpPr>
-          <p:nvPr>
-            <p:ph type="title"/>
-          </p:nvPr>
-        </p:nvSpPr>
-        <p:spPr>
-          <a:xfrm>
-            <a:off x="6069598" y="679269"/>
-            <a:ext cx="5086082" cy="1058091"/>
-          </a:xfrm>
-        </p:spPr>
-        <p:txBody>
-          <a:bodyPr>
-            <a:normAutofit/>
-          </a:bodyPr>
-          <a:lstStyle/>
-          <a:p>
-            <a:pPr algn="r"/>
-            <a:r>
-              <a:rPr lang="fa-IR" dirty="0"/>
-              <a:t>کاربرد ها و مرتبه زمانی</a:t>
-            </a:r>
-            <a:endParaRPr lang="en-US" dirty="0"/>
-          </a:p>
-        </p:txBody>
-      </p:sp>
-      <p:sp>
-        <p:nvSpPr>
-          <p:cNvPr id="5" name="Rectangle 4"/>
-          <p:cNvSpPr/>
-          <p:nvPr/>
-        </p:nvSpPr>
-        <p:spPr>
-          <a:xfrm>
-            <a:off x="6315272" y="2255840"/>
-            <a:ext cx="4840408" cy="584775"/>
-          </a:xfrm>
-          <a:prstGeom prst="rect">
-            <a:avLst/>
-          </a:prstGeom>
-        </p:spPr>
-        <p:txBody>
-          <a:bodyPr wrap="square">
-            <a:spAutoFit/>
-          </a:bodyPr>
-          <a:lstStyle/>
-          <a:p>
-            <a:pPr algn="r"/>
-            <a:r>
-              <a:rPr lang="fa-IR" sz="3200" dirty="0"/>
-              <a:t>مسئله1: تطابق رشته کامل</a:t>
-            </a:r>
-            <a:endParaRPr lang="en-US" sz="3200" dirty="0"/>
-          </a:p>
-        </p:txBody>
-      </p:sp>
-      <p:sp>
-        <p:nvSpPr>
-          <p:cNvPr id="6" name="Oval 5"/>
-          <p:cNvSpPr/>
-          <p:nvPr/>
-        </p:nvSpPr>
-        <p:spPr>
-          <a:xfrm>
-            <a:off x="3200391" y="2211615"/>
-            <a:ext cx="339969" cy="298086"/>
-          </a:xfrm>
-          <a:prstGeom prst="ellipse">
-            <a:avLst/>
-          </a:prstGeom>
-          <a:solidFill>
-            <a:schemeClr val="accent1">
-              <a:lumMod val="50000"/>
-            </a:schemeClr>
-          </a:solidFill>
-        </p:spPr>
-        <p:style>
-          <a:lnRef idx="2">
-            <a:schemeClr val="accent1">
-              <a:shade val="50000"/>
-            </a:schemeClr>
-          </a:lnRef>
-          <a:fillRef idx="1">
-            <a:schemeClr val="accent1"/>
-          </a:fillRef>
-          <a:effectRef idx="0">
-            <a:schemeClr val="accent1"/>
-          </a:effectRef>
-          <a:fontRef idx="minor">
-            <a:schemeClr val="lt1"/>
-          </a:fontRef>
-        </p:style>
-        <p:txBody>
-          <a:bodyPr rtlCol="0" anchor="ctr"/>
-          <a:lstStyle/>
-          <a:p>
-            <a:pPr algn="ctr"/>
-            <a:endParaRPr lang="en-US"/>
-          </a:p>
-        </p:txBody>
-      </p:sp>
-      <p:sp>
-        <p:nvSpPr>
-          <p:cNvPr id="7" name="Oval 6"/>
-          <p:cNvSpPr/>
-          <p:nvPr/>
-        </p:nvSpPr>
-        <p:spPr>
-          <a:xfrm>
-            <a:off x="2127741" y="3016185"/>
-            <a:ext cx="339969" cy="298086"/>
-          </a:xfrm>
-          <a:prstGeom prst="ellipse">
-            <a:avLst/>
-          </a:prstGeom>
-          <a:solidFill>
-            <a:schemeClr val="accent1">
-              <a:lumMod val="50000"/>
-            </a:schemeClr>
-          </a:solidFill>
-        </p:spPr>
-        <p:style>
-          <a:lnRef idx="2">
-            <a:schemeClr val="accent1">
-              <a:shade val="50000"/>
-            </a:schemeClr>
-          </a:lnRef>
-          <a:fillRef idx="1">
-            <a:schemeClr val="accent1"/>
-          </a:fillRef>
-          <a:effectRef idx="0">
-            <a:schemeClr val="accent1"/>
-          </a:effectRef>
-          <a:fontRef idx="minor">
-            <a:schemeClr val="lt1"/>
-          </a:fontRef>
-        </p:style>
-        <p:txBody>
-          <a:bodyPr rtlCol="0" anchor="ctr"/>
-          <a:lstStyle/>
-          <a:p>
-            <a:pPr algn="ctr"/>
-            <a:endParaRPr lang="en-US"/>
-          </a:p>
-        </p:txBody>
-      </p:sp>
-      <p:sp>
-        <p:nvSpPr>
-          <p:cNvPr id="8" name="Oval 7"/>
-          <p:cNvSpPr/>
-          <p:nvPr/>
-        </p:nvSpPr>
-        <p:spPr>
-          <a:xfrm>
-            <a:off x="4513382" y="3016185"/>
-            <a:ext cx="339969" cy="298086"/>
-          </a:xfrm>
-          <a:prstGeom prst="ellipse">
-            <a:avLst/>
-          </a:prstGeom>
-          <a:solidFill>
-            <a:schemeClr val="accent1">
-              <a:lumMod val="50000"/>
-            </a:schemeClr>
-          </a:solidFill>
-        </p:spPr>
-        <p:style>
-          <a:lnRef idx="2">
-            <a:schemeClr val="accent1">
-              <a:shade val="50000"/>
-            </a:schemeClr>
-          </a:lnRef>
-          <a:fillRef idx="1">
-            <a:schemeClr val="accent1"/>
-          </a:fillRef>
-          <a:effectRef idx="0">
-            <a:schemeClr val="accent1"/>
-          </a:effectRef>
-          <a:fontRef idx="minor">
-            <a:schemeClr val="lt1"/>
-          </a:fontRef>
-        </p:style>
-        <p:txBody>
-          <a:bodyPr rtlCol="0" anchor="ctr"/>
-          <a:lstStyle/>
-          <a:p>
-            <a:pPr algn="ctr"/>
-            <a:endParaRPr lang="en-US"/>
-          </a:p>
-        </p:txBody>
-      </p:sp>
-      <p:sp>
-        <p:nvSpPr>
-          <p:cNvPr id="9" name="Oval 8"/>
-          <p:cNvSpPr/>
-          <p:nvPr/>
-        </p:nvSpPr>
-        <p:spPr>
-          <a:xfrm>
-            <a:off x="2861681" y="3850685"/>
-            <a:ext cx="339969" cy="298086"/>
-          </a:xfrm>
-          <a:prstGeom prst="ellipse">
-            <a:avLst/>
-          </a:prstGeom>
-          <a:solidFill>
-            <a:schemeClr val="accent1">
-              <a:lumMod val="50000"/>
-            </a:schemeClr>
-          </a:solidFill>
-        </p:spPr>
-        <p:style>
-          <a:lnRef idx="2">
-            <a:schemeClr val="accent1">
-              <a:shade val="50000"/>
-            </a:schemeClr>
-          </a:lnRef>
-          <a:fillRef idx="1">
-            <a:schemeClr val="accent1"/>
-          </a:fillRef>
-          <a:effectRef idx="0">
-            <a:schemeClr val="accent1"/>
-          </a:effectRef>
-          <a:fontRef idx="minor">
-            <a:schemeClr val="lt1"/>
-          </a:fontRef>
-        </p:style>
-        <p:txBody>
-          <a:bodyPr rtlCol="0" anchor="ctr"/>
-          <a:lstStyle/>
-          <a:p>
-            <a:pPr algn="ctr"/>
-            <a:endParaRPr lang="en-US"/>
-          </a:p>
-        </p:txBody>
-      </p:sp>
-      <p:sp>
-        <p:nvSpPr>
-          <p:cNvPr id="10" name="Oval 9"/>
-          <p:cNvSpPr/>
-          <p:nvPr/>
-        </p:nvSpPr>
-        <p:spPr>
-          <a:xfrm>
-            <a:off x="5854502" y="3749024"/>
-            <a:ext cx="339969" cy="298086"/>
-          </a:xfrm>
-          <a:prstGeom prst="ellipse">
-            <a:avLst/>
-          </a:prstGeom>
-          <a:solidFill>
-            <a:schemeClr val="accent1">
-              <a:lumMod val="50000"/>
-            </a:schemeClr>
-          </a:solidFill>
-          <a:ln>
-            <a:solidFill>
-              <a:schemeClr val="accent1">
-                <a:lumMod val="50000"/>
-              </a:schemeClr>
-            </a:solidFill>
-          </a:ln>
-        </p:spPr>
-        <p:style>
-          <a:lnRef idx="2">
-            <a:schemeClr val="accent1">
-              <a:shade val="50000"/>
-            </a:schemeClr>
-          </a:lnRef>
-          <a:fillRef idx="1">
-            <a:schemeClr val="accent1"/>
-          </a:fillRef>
-          <a:effectRef idx="0">
-            <a:schemeClr val="accent1"/>
-          </a:effectRef>
-          <a:fontRef idx="minor">
-            <a:schemeClr val="lt1"/>
-          </a:fontRef>
-        </p:style>
-        <p:txBody>
-          <a:bodyPr rtlCol="0" anchor="ctr"/>
-          <a:lstStyle/>
-          <a:p>
-            <a:pPr algn="ctr"/>
-            <a:endParaRPr lang="en-US"/>
-          </a:p>
-        </p:txBody>
-      </p:sp>
-      <p:sp>
-        <p:nvSpPr>
-          <p:cNvPr id="11" name="Oval 10"/>
-          <p:cNvSpPr/>
-          <p:nvPr/>
-        </p:nvSpPr>
-        <p:spPr>
-          <a:xfrm>
-            <a:off x="3519319" y="4777978"/>
-            <a:ext cx="339969" cy="298086"/>
-          </a:xfrm>
-          <a:prstGeom prst="ellipse">
-            <a:avLst/>
-          </a:prstGeom>
-          <a:solidFill>
-            <a:schemeClr val="accent1">
-              <a:lumMod val="50000"/>
-            </a:schemeClr>
-          </a:solidFill>
-        </p:spPr>
-        <p:style>
-          <a:lnRef idx="2">
-            <a:schemeClr val="accent1">
-              <a:shade val="50000"/>
-            </a:schemeClr>
-          </a:lnRef>
-          <a:fillRef idx="1">
-            <a:schemeClr val="accent1"/>
-          </a:fillRef>
-          <a:effectRef idx="0">
-            <a:schemeClr val="accent1"/>
-          </a:effectRef>
-          <a:fontRef idx="minor">
-            <a:schemeClr val="lt1"/>
-          </a:fontRef>
-        </p:style>
-        <p:txBody>
-          <a:bodyPr rtlCol="0" anchor="ctr"/>
-          <a:lstStyle/>
-          <a:p>
-            <a:pPr algn="ctr"/>
-            <a:endParaRPr lang="en-US"/>
-          </a:p>
-        </p:txBody>
-      </p:sp>
-      <p:sp>
-        <p:nvSpPr>
-          <p:cNvPr id="12" name="Oval 11"/>
-          <p:cNvSpPr/>
-          <p:nvPr/>
-        </p:nvSpPr>
-        <p:spPr>
-          <a:xfrm>
-            <a:off x="6969364" y="4617226"/>
-            <a:ext cx="339969" cy="298086"/>
-          </a:xfrm>
-          <a:prstGeom prst="ellipse">
-            <a:avLst/>
-          </a:prstGeom>
-          <a:solidFill>
-            <a:schemeClr val="accent1">
-              <a:lumMod val="50000"/>
-            </a:schemeClr>
-          </a:solidFill>
-        </p:spPr>
-        <p:style>
-          <a:lnRef idx="2">
-            <a:schemeClr val="accent1">
-              <a:shade val="50000"/>
-            </a:schemeClr>
-          </a:lnRef>
-          <a:fillRef idx="1">
-            <a:schemeClr val="accent1"/>
-          </a:fillRef>
-          <a:effectRef idx="0">
-            <a:schemeClr val="accent1"/>
-          </a:effectRef>
-          <a:fontRef idx="minor">
-            <a:schemeClr val="lt1"/>
-          </a:fontRef>
-        </p:style>
-        <p:txBody>
-          <a:bodyPr rtlCol="0" anchor="ctr"/>
-          <a:lstStyle/>
-          <a:p>
-            <a:pPr algn="ctr"/>
-            <a:endParaRPr lang="en-US"/>
-          </a:p>
-        </p:txBody>
-      </p:sp>
-      <p:sp>
-        <p:nvSpPr>
-          <p:cNvPr id="13" name="Rectangle 12"/>
-          <p:cNvSpPr/>
-          <p:nvPr/>
-        </p:nvSpPr>
-        <p:spPr>
-          <a:xfrm>
-            <a:off x="1230922" y="3767170"/>
-            <a:ext cx="339969" cy="378499"/>
-          </a:xfrm>
-          <a:prstGeom prst="rect">
-            <a:avLst/>
-          </a:prstGeom>
-          <a:solidFill>
-            <a:schemeClr val="accent1">
-              <a:lumMod val="50000"/>
-            </a:schemeClr>
-          </a:solidFill>
-          <a:ln>
-            <a:solidFill>
-              <a:schemeClr val="accent1">
-                <a:lumMod val="50000"/>
-              </a:schemeClr>
-            </a:solidFill>
-          </a:ln>
-        </p:spPr>
-        <p:style>
-          <a:lnRef idx="2">
-            <a:schemeClr val="accent1">
-              <a:shade val="50000"/>
-            </a:schemeClr>
-          </a:lnRef>
-          <a:fillRef idx="1">
-            <a:schemeClr val="accent1"/>
-          </a:fillRef>
-          <a:effectRef idx="0">
-            <a:schemeClr val="accent1"/>
-          </a:effectRef>
-          <a:fontRef idx="minor">
-            <a:schemeClr val="lt1"/>
-          </a:fontRef>
-        </p:style>
-        <p:txBody>
-          <a:bodyPr rtlCol="0" anchor="ctr"/>
-          <a:lstStyle/>
-          <a:p>
-            <a:pPr algn="ctr"/>
-            <a:endParaRPr lang="en-US"/>
-          </a:p>
-        </p:txBody>
-      </p:sp>
-      <p:sp>
-        <p:nvSpPr>
-          <p:cNvPr id="14" name="Rectangle 13"/>
-          <p:cNvSpPr/>
-          <p:nvPr/>
-        </p:nvSpPr>
-        <p:spPr>
-          <a:xfrm>
-            <a:off x="2268416" y="4726062"/>
-            <a:ext cx="339969" cy="378499"/>
-          </a:xfrm>
-          <a:prstGeom prst="rect">
-            <a:avLst/>
-          </a:prstGeom>
-          <a:solidFill>
-            <a:schemeClr val="accent1">
-              <a:lumMod val="50000"/>
-            </a:schemeClr>
-          </a:solidFill>
-          <a:ln>
-            <a:solidFill>
-              <a:schemeClr val="accent1">
-                <a:lumMod val="50000"/>
-              </a:schemeClr>
-            </a:solidFill>
-          </a:ln>
-        </p:spPr>
-        <p:style>
-          <a:lnRef idx="2">
-            <a:schemeClr val="accent1">
-              <a:shade val="50000"/>
-            </a:schemeClr>
-          </a:lnRef>
-          <a:fillRef idx="1">
-            <a:schemeClr val="accent1"/>
-          </a:fillRef>
-          <a:effectRef idx="0">
-            <a:schemeClr val="accent1"/>
-          </a:effectRef>
-          <a:fontRef idx="minor">
-            <a:schemeClr val="lt1"/>
-          </a:fontRef>
-        </p:style>
-        <p:txBody>
-          <a:bodyPr rtlCol="0" anchor="ctr"/>
-          <a:lstStyle/>
-          <a:p>
-            <a:pPr algn="ctr"/>
-            <a:endParaRPr lang="en-US"/>
-          </a:p>
-        </p:txBody>
-      </p:sp>
-      <p:sp>
-        <p:nvSpPr>
-          <p:cNvPr id="15" name="Rectangle 14"/>
-          <p:cNvSpPr/>
-          <p:nvPr/>
-        </p:nvSpPr>
-        <p:spPr>
-          <a:xfrm>
-            <a:off x="3859288" y="3776731"/>
-            <a:ext cx="339969" cy="378499"/>
-          </a:xfrm>
-          <a:prstGeom prst="rect">
-            <a:avLst/>
-          </a:prstGeom>
-          <a:solidFill>
-            <a:schemeClr val="accent1">
-              <a:lumMod val="50000"/>
-            </a:schemeClr>
-          </a:solidFill>
-          <a:ln>
-            <a:solidFill>
-              <a:schemeClr val="accent1">
-                <a:lumMod val="50000"/>
-              </a:schemeClr>
-            </a:solidFill>
-          </a:ln>
-        </p:spPr>
-        <p:style>
-          <a:lnRef idx="2">
-            <a:schemeClr val="accent1">
-              <a:shade val="50000"/>
-            </a:schemeClr>
-          </a:lnRef>
-          <a:fillRef idx="1">
-            <a:schemeClr val="accent1"/>
-          </a:fillRef>
-          <a:effectRef idx="0">
-            <a:schemeClr val="accent1"/>
-          </a:effectRef>
-          <a:fontRef idx="minor">
-            <a:schemeClr val="lt1"/>
-          </a:fontRef>
-        </p:style>
-        <p:txBody>
-          <a:bodyPr rtlCol="0" anchor="ctr"/>
-          <a:lstStyle/>
-          <a:p>
-            <a:pPr algn="ctr"/>
-            <a:endParaRPr lang="en-US"/>
-          </a:p>
-        </p:txBody>
-      </p:sp>
-      <p:sp>
-        <p:nvSpPr>
-          <p:cNvPr id="16" name="Rectangle 15"/>
-          <p:cNvSpPr/>
-          <p:nvPr/>
-        </p:nvSpPr>
-        <p:spPr>
-          <a:xfrm>
-            <a:off x="5234337" y="4548522"/>
-            <a:ext cx="339969" cy="378499"/>
-          </a:xfrm>
-          <a:prstGeom prst="rect">
-            <a:avLst/>
-          </a:prstGeom>
-          <a:solidFill>
-            <a:schemeClr val="accent1">
-              <a:lumMod val="50000"/>
-            </a:schemeClr>
-          </a:solidFill>
-          <a:ln>
-            <a:solidFill>
-              <a:schemeClr val="accent1">
-                <a:lumMod val="50000"/>
-              </a:schemeClr>
-            </a:solidFill>
-          </a:ln>
-        </p:spPr>
-        <p:style>
-          <a:lnRef idx="2">
-            <a:schemeClr val="accent1">
-              <a:shade val="50000"/>
-            </a:schemeClr>
-          </a:lnRef>
-          <a:fillRef idx="1">
-            <a:schemeClr val="accent1"/>
-          </a:fillRef>
-          <a:effectRef idx="0">
-            <a:schemeClr val="accent1"/>
-          </a:effectRef>
-          <a:fontRef idx="minor">
-            <a:schemeClr val="lt1"/>
-          </a:fontRef>
-        </p:style>
-        <p:txBody>
-          <a:bodyPr rtlCol="0" anchor="ctr"/>
-          <a:lstStyle/>
-          <a:p>
-            <a:pPr algn="ctr"/>
-            <a:endParaRPr lang="en-US"/>
-          </a:p>
-        </p:txBody>
-      </p:sp>
-      <p:sp>
-        <p:nvSpPr>
-          <p:cNvPr id="17" name="Rectangle 16"/>
-          <p:cNvSpPr/>
-          <p:nvPr/>
-        </p:nvSpPr>
-        <p:spPr>
-          <a:xfrm>
-            <a:off x="2825254" y="5588517"/>
-            <a:ext cx="339969" cy="378499"/>
-          </a:xfrm>
-          <a:prstGeom prst="rect">
-            <a:avLst/>
-          </a:prstGeom>
-          <a:solidFill>
-            <a:schemeClr val="accent1">
-              <a:lumMod val="50000"/>
-            </a:schemeClr>
-          </a:solidFill>
-          <a:ln>
-            <a:solidFill>
-              <a:schemeClr val="accent1">
-                <a:lumMod val="50000"/>
-              </a:schemeClr>
-            </a:solidFill>
-          </a:ln>
-        </p:spPr>
-        <p:style>
-          <a:lnRef idx="2">
-            <a:schemeClr val="accent1">
-              <a:shade val="50000"/>
-            </a:schemeClr>
-          </a:lnRef>
-          <a:fillRef idx="1">
-            <a:schemeClr val="accent1"/>
-          </a:fillRef>
-          <a:effectRef idx="0">
-            <a:schemeClr val="accent1"/>
-          </a:effectRef>
-          <a:fontRef idx="minor">
-            <a:schemeClr val="lt1"/>
-          </a:fontRef>
-        </p:style>
-        <p:txBody>
-          <a:bodyPr rtlCol="0" anchor="ctr"/>
-          <a:lstStyle/>
-          <a:p>
-            <a:pPr algn="ctr"/>
-            <a:endParaRPr lang="en-US"/>
-          </a:p>
-        </p:txBody>
-      </p:sp>
-      <p:sp>
-        <p:nvSpPr>
-          <p:cNvPr id="18" name="Rectangle 17"/>
-          <p:cNvSpPr/>
-          <p:nvPr/>
-        </p:nvSpPr>
-        <p:spPr>
-          <a:xfrm>
-            <a:off x="4411051" y="5583535"/>
-            <a:ext cx="339969" cy="378499"/>
-          </a:xfrm>
-          <a:prstGeom prst="rect">
-            <a:avLst/>
-          </a:prstGeom>
-          <a:solidFill>
-            <a:schemeClr val="accent1">
-              <a:lumMod val="50000"/>
-            </a:schemeClr>
-          </a:solidFill>
-          <a:ln>
-            <a:solidFill>
-              <a:schemeClr val="accent1">
-                <a:lumMod val="50000"/>
-              </a:schemeClr>
-            </a:solidFill>
-          </a:ln>
-        </p:spPr>
-        <p:style>
-          <a:lnRef idx="2">
-            <a:schemeClr val="accent1">
-              <a:shade val="50000"/>
-            </a:schemeClr>
-          </a:lnRef>
-          <a:fillRef idx="1">
-            <a:schemeClr val="accent1"/>
-          </a:fillRef>
-          <a:effectRef idx="0">
-            <a:schemeClr val="accent1"/>
-          </a:effectRef>
-          <a:fontRef idx="minor">
-            <a:schemeClr val="lt1"/>
-          </a:fontRef>
-        </p:style>
-        <p:txBody>
-          <a:bodyPr rtlCol="0" anchor="ctr"/>
-          <a:lstStyle/>
-          <a:p>
-            <a:pPr algn="ctr"/>
-            <a:endParaRPr lang="en-US"/>
-          </a:p>
-        </p:txBody>
-      </p:sp>
-      <p:sp>
-        <p:nvSpPr>
-          <p:cNvPr id="19" name="Rectangle 18"/>
-          <p:cNvSpPr/>
-          <p:nvPr/>
-        </p:nvSpPr>
-        <p:spPr>
-          <a:xfrm>
-            <a:off x="6301651" y="5454576"/>
-            <a:ext cx="339969" cy="378499"/>
-          </a:xfrm>
-          <a:prstGeom prst="rect">
-            <a:avLst/>
-          </a:prstGeom>
-          <a:solidFill>
-            <a:schemeClr val="accent1">
-              <a:lumMod val="50000"/>
-            </a:schemeClr>
-          </a:solidFill>
-          <a:ln>
-            <a:solidFill>
-              <a:schemeClr val="accent1">
-                <a:lumMod val="50000"/>
-              </a:schemeClr>
-            </a:solidFill>
-          </a:ln>
-        </p:spPr>
-        <p:style>
-          <a:lnRef idx="2">
-            <a:schemeClr val="accent1">
-              <a:shade val="50000"/>
-            </a:schemeClr>
-          </a:lnRef>
-          <a:fillRef idx="1">
-            <a:schemeClr val="accent1"/>
-          </a:fillRef>
-          <a:effectRef idx="0">
-            <a:schemeClr val="accent1"/>
-          </a:effectRef>
-          <a:fontRef idx="minor">
-            <a:schemeClr val="lt1"/>
-          </a:fontRef>
-        </p:style>
-        <p:txBody>
-          <a:bodyPr rtlCol="0" anchor="ctr"/>
-          <a:lstStyle/>
-          <a:p>
-            <a:pPr algn="ctr"/>
-            <a:endParaRPr lang="en-US"/>
-          </a:p>
-        </p:txBody>
-      </p:sp>
-      <p:sp>
-        <p:nvSpPr>
-          <p:cNvPr id="20" name="Rectangle 19"/>
-          <p:cNvSpPr/>
-          <p:nvPr/>
-        </p:nvSpPr>
-        <p:spPr>
-          <a:xfrm>
-            <a:off x="8077150" y="5489702"/>
-            <a:ext cx="339969" cy="378499"/>
-          </a:xfrm>
-          <a:prstGeom prst="rect">
-            <a:avLst/>
-          </a:prstGeom>
-          <a:solidFill>
-            <a:schemeClr val="accent1">
-              <a:lumMod val="50000"/>
-            </a:schemeClr>
-          </a:solidFill>
-          <a:ln>
-            <a:solidFill>
-              <a:schemeClr val="accent1">
-                <a:lumMod val="50000"/>
-              </a:schemeClr>
-            </a:solidFill>
-          </a:ln>
-        </p:spPr>
-        <p:style>
-          <a:lnRef idx="2">
-            <a:schemeClr val="accent1">
-              <a:shade val="50000"/>
-            </a:schemeClr>
-          </a:lnRef>
-          <a:fillRef idx="1">
-            <a:schemeClr val="accent1"/>
-          </a:fillRef>
-          <a:effectRef idx="0">
-            <a:schemeClr val="accent1"/>
-          </a:effectRef>
-          <a:fontRef idx="minor">
-            <a:schemeClr val="lt1"/>
-          </a:fontRef>
-        </p:style>
-        <p:txBody>
-          <a:bodyPr rtlCol="0" anchor="ctr"/>
-          <a:lstStyle/>
-          <a:p>
-            <a:pPr algn="ctr"/>
-            <a:endParaRPr lang="en-US"/>
-          </a:p>
-        </p:txBody>
-      </p:sp>
-      <p:cxnSp>
-        <p:nvCxnSpPr>
-          <p:cNvPr id="22" name="Straight Arrow Connector 21"/>
-          <p:cNvCxnSpPr/>
-          <p:nvPr/>
-        </p:nvCxnSpPr>
-        <p:spPr>
-          <a:xfrm flipH="1">
-            <a:off x="2467710" y="2509701"/>
-            <a:ext cx="641316" cy="506484"/>
-          </a:xfrm>
-          <a:prstGeom prst="straightConnector1">
-            <a:avLst/>
-          </a:prstGeom>
-          <a:ln>
-            <a:tailEnd type="triangle"/>
-          </a:ln>
-        </p:spPr>
-        <p:style>
-          <a:lnRef idx="1">
-            <a:schemeClr val="accent1"/>
-          </a:lnRef>
-          <a:fillRef idx="0">
-            <a:schemeClr val="accent1"/>
-          </a:fillRef>
-          <a:effectRef idx="0">
-            <a:schemeClr val="accent1"/>
-          </a:effectRef>
-          <a:fontRef idx="minor">
-            <a:schemeClr val="tx1"/>
-          </a:fontRef>
-        </p:style>
-      </p:cxnSp>
-      <p:cxnSp>
-        <p:nvCxnSpPr>
-          <p:cNvPr id="25" name="Straight Arrow Connector 24"/>
-          <p:cNvCxnSpPr/>
-          <p:nvPr/>
-        </p:nvCxnSpPr>
-        <p:spPr>
-          <a:xfrm flipH="1">
-            <a:off x="1735019" y="3314271"/>
-            <a:ext cx="392722" cy="343329"/>
-          </a:xfrm>
-          <a:prstGeom prst="straightConnector1">
-            <a:avLst/>
-          </a:prstGeom>
-          <a:ln>
-            <a:tailEnd type="triangle"/>
-          </a:ln>
-        </p:spPr>
-        <p:style>
-          <a:lnRef idx="1">
-            <a:schemeClr val="accent1"/>
-          </a:lnRef>
-          <a:fillRef idx="0">
-            <a:schemeClr val="accent1"/>
-          </a:fillRef>
-          <a:effectRef idx="0">
-            <a:schemeClr val="accent1"/>
-          </a:effectRef>
-          <a:fontRef idx="minor">
-            <a:schemeClr val="tx1"/>
-          </a:fontRef>
-        </p:style>
-      </p:cxnSp>
-      <p:cxnSp>
-        <p:nvCxnSpPr>
-          <p:cNvPr id="27" name="Straight Arrow Connector 26"/>
-          <p:cNvCxnSpPr/>
-          <p:nvPr/>
-        </p:nvCxnSpPr>
-        <p:spPr>
-          <a:xfrm>
-            <a:off x="7268308" y="-1125415"/>
-            <a:ext cx="0" cy="0"/>
-          </a:xfrm>
-          <a:prstGeom prst="straightConnector1">
-            <a:avLst/>
-          </a:prstGeom>
-          <a:ln>
-            <a:tailEnd type="triangle"/>
-          </a:ln>
-        </p:spPr>
-        <p:style>
-          <a:lnRef idx="1">
-            <a:schemeClr val="accent1"/>
-          </a:lnRef>
-          <a:fillRef idx="0">
-            <a:schemeClr val="accent1"/>
-          </a:fillRef>
-          <a:effectRef idx="0">
-            <a:schemeClr val="accent1"/>
-          </a:effectRef>
-          <a:fontRef idx="minor">
-            <a:schemeClr val="tx1"/>
-          </a:fontRef>
-        </p:style>
-      </p:cxnSp>
-      <p:cxnSp>
-        <p:nvCxnSpPr>
-          <p:cNvPr id="29" name="Straight Arrow Connector 28"/>
-          <p:cNvCxnSpPr/>
-          <p:nvPr/>
-        </p:nvCxnSpPr>
-        <p:spPr>
-          <a:xfrm>
-            <a:off x="3540360" y="2509701"/>
-            <a:ext cx="744417" cy="506484"/>
-          </a:xfrm>
-          <a:prstGeom prst="straightConnector1">
-            <a:avLst/>
-          </a:prstGeom>
-          <a:ln>
-            <a:tailEnd type="triangle"/>
-          </a:ln>
-        </p:spPr>
-        <p:style>
-          <a:lnRef idx="1">
-            <a:schemeClr val="accent1"/>
-          </a:lnRef>
-          <a:fillRef idx="0">
-            <a:schemeClr val="accent1"/>
-          </a:fillRef>
-          <a:effectRef idx="0">
-            <a:schemeClr val="accent1"/>
-          </a:effectRef>
-          <a:fontRef idx="minor">
-            <a:schemeClr val="tx1"/>
-          </a:fontRef>
-        </p:style>
-      </p:cxnSp>
-      <p:cxnSp>
-        <p:nvCxnSpPr>
-          <p:cNvPr id="30" name="Straight Arrow Connector 29"/>
-          <p:cNvCxnSpPr/>
-          <p:nvPr/>
-        </p:nvCxnSpPr>
-        <p:spPr>
-          <a:xfrm>
-            <a:off x="4970573" y="3295144"/>
-            <a:ext cx="744417" cy="506484"/>
-          </a:xfrm>
-          <a:prstGeom prst="straightConnector1">
-            <a:avLst/>
-          </a:prstGeom>
-          <a:ln>
-            <a:tailEnd type="triangle"/>
-          </a:ln>
-        </p:spPr>
-        <p:style>
-          <a:lnRef idx="1">
-            <a:schemeClr val="accent1"/>
-          </a:lnRef>
-          <a:fillRef idx="0">
-            <a:schemeClr val="accent1"/>
-          </a:fillRef>
-          <a:effectRef idx="0">
-            <a:schemeClr val="accent1"/>
-          </a:effectRef>
-          <a:fontRef idx="minor">
-            <a:schemeClr val="tx1"/>
-          </a:fontRef>
-        </p:style>
-      </p:cxnSp>
-      <p:cxnSp>
-        <p:nvCxnSpPr>
-          <p:cNvPr id="31" name="Straight Arrow Connector 30"/>
-          <p:cNvCxnSpPr/>
-          <p:nvPr/>
-        </p:nvCxnSpPr>
-        <p:spPr>
-          <a:xfrm>
-            <a:off x="6201494" y="4092309"/>
-            <a:ext cx="744417" cy="506484"/>
-          </a:xfrm>
-          <a:prstGeom prst="straightConnector1">
-            <a:avLst/>
-          </a:prstGeom>
-          <a:ln>
-            <a:tailEnd type="triangle"/>
-          </a:ln>
-        </p:spPr>
-        <p:style>
-          <a:lnRef idx="1">
-            <a:schemeClr val="accent1"/>
-          </a:lnRef>
-          <a:fillRef idx="0">
-            <a:schemeClr val="accent1"/>
-          </a:fillRef>
-          <a:effectRef idx="0">
-            <a:schemeClr val="accent1"/>
-          </a:effectRef>
-          <a:fontRef idx="minor">
-            <a:schemeClr val="tx1"/>
-          </a:fontRef>
-        </p:style>
-      </p:cxnSp>
-      <p:cxnSp>
-        <p:nvCxnSpPr>
-          <p:cNvPr id="32" name="Straight Arrow Connector 31"/>
-          <p:cNvCxnSpPr/>
-          <p:nvPr/>
-        </p:nvCxnSpPr>
-        <p:spPr>
-          <a:xfrm>
-            <a:off x="7268296" y="4948092"/>
-            <a:ext cx="744417" cy="506484"/>
-          </a:xfrm>
-          <a:prstGeom prst="straightConnector1">
-            <a:avLst/>
-          </a:prstGeom>
-          <a:ln>
-            <a:tailEnd type="triangle"/>
-          </a:ln>
-        </p:spPr>
-        <p:style>
-          <a:lnRef idx="1">
-            <a:schemeClr val="accent1"/>
-          </a:lnRef>
-          <a:fillRef idx="0">
-            <a:schemeClr val="accent1"/>
-          </a:fillRef>
-          <a:effectRef idx="0">
-            <a:schemeClr val="accent1"/>
-          </a:effectRef>
-          <a:fontRef idx="minor">
-            <a:schemeClr val="tx1"/>
-          </a:fontRef>
-        </p:style>
-      </p:cxnSp>
-      <p:cxnSp>
-        <p:nvCxnSpPr>
-          <p:cNvPr id="34" name="Straight Arrow Connector 33"/>
-          <p:cNvCxnSpPr/>
-          <p:nvPr/>
-        </p:nvCxnSpPr>
-        <p:spPr>
-          <a:xfrm>
-            <a:off x="2414949" y="3353759"/>
-            <a:ext cx="445473" cy="447869"/>
-          </a:xfrm>
-          <a:prstGeom prst="straightConnector1">
-            <a:avLst/>
-          </a:prstGeom>
-          <a:ln>
-            <a:tailEnd type="triangle"/>
-          </a:ln>
-        </p:spPr>
-        <p:style>
-          <a:lnRef idx="1">
-            <a:schemeClr val="accent1"/>
-          </a:lnRef>
-          <a:fillRef idx="0">
-            <a:schemeClr val="accent1"/>
-          </a:fillRef>
-          <a:effectRef idx="0">
-            <a:schemeClr val="accent1"/>
-          </a:effectRef>
-          <a:fontRef idx="minor">
-            <a:schemeClr val="tx1"/>
-          </a:fontRef>
-        </p:style>
-      </p:cxnSp>
-      <p:cxnSp>
-        <p:nvCxnSpPr>
-          <p:cNvPr id="39" name="Straight Arrow Connector 38"/>
-          <p:cNvCxnSpPr/>
-          <p:nvPr/>
-        </p:nvCxnSpPr>
-        <p:spPr>
-          <a:xfrm>
-            <a:off x="3165223" y="4244710"/>
-            <a:ext cx="445473" cy="447869"/>
-          </a:xfrm>
-          <a:prstGeom prst="straightConnector1">
-            <a:avLst/>
-          </a:prstGeom>
-          <a:ln>
-            <a:tailEnd type="triangle"/>
-          </a:ln>
-        </p:spPr>
-        <p:style>
-          <a:lnRef idx="1">
-            <a:schemeClr val="accent1"/>
-          </a:lnRef>
-          <a:fillRef idx="0">
-            <a:schemeClr val="accent1"/>
-          </a:fillRef>
-          <a:effectRef idx="0">
-            <a:schemeClr val="accent1"/>
-          </a:effectRef>
-          <a:fontRef idx="minor">
-            <a:schemeClr val="tx1"/>
-          </a:fontRef>
-        </p:style>
-      </p:cxnSp>
-      <p:cxnSp>
-        <p:nvCxnSpPr>
-          <p:cNvPr id="40" name="Straight Arrow Connector 39"/>
-          <p:cNvCxnSpPr/>
-          <p:nvPr/>
-        </p:nvCxnSpPr>
-        <p:spPr>
-          <a:xfrm>
-            <a:off x="3845163" y="5135666"/>
-            <a:ext cx="445473" cy="447869"/>
-          </a:xfrm>
-          <a:prstGeom prst="straightConnector1">
-            <a:avLst/>
-          </a:prstGeom>
-          <a:ln>
-            <a:tailEnd type="triangle"/>
-          </a:ln>
-        </p:spPr>
-        <p:style>
-          <a:lnRef idx="1">
-            <a:schemeClr val="accent1"/>
-          </a:lnRef>
-          <a:fillRef idx="0">
-            <a:schemeClr val="accent1"/>
-          </a:fillRef>
-          <a:effectRef idx="0">
-            <a:schemeClr val="accent1"/>
-          </a:effectRef>
-          <a:fontRef idx="minor">
-            <a:schemeClr val="tx1"/>
-          </a:fontRef>
-        </p:style>
-      </p:cxnSp>
-      <p:cxnSp>
-        <p:nvCxnSpPr>
-          <p:cNvPr id="42" name="Straight Arrow Connector 41"/>
-          <p:cNvCxnSpPr/>
-          <p:nvPr/>
-        </p:nvCxnSpPr>
-        <p:spPr>
-          <a:xfrm flipH="1">
-            <a:off x="4237892" y="3373873"/>
-            <a:ext cx="275490" cy="332905"/>
-          </a:xfrm>
-          <a:prstGeom prst="straightConnector1">
-            <a:avLst/>
-          </a:prstGeom>
-          <a:ln>
-            <a:tailEnd type="triangle"/>
-          </a:ln>
-        </p:spPr>
-        <p:style>
-          <a:lnRef idx="1">
-            <a:schemeClr val="accent1"/>
-          </a:lnRef>
-          <a:fillRef idx="0">
-            <a:schemeClr val="accent1"/>
-          </a:fillRef>
-          <a:effectRef idx="0">
-            <a:schemeClr val="accent1"/>
-          </a:effectRef>
-          <a:fontRef idx="minor">
-            <a:schemeClr val="tx1"/>
-          </a:fontRef>
-        </p:style>
-      </p:cxnSp>
-      <p:cxnSp>
-        <p:nvCxnSpPr>
-          <p:cNvPr id="46" name="Straight Arrow Connector 45"/>
-          <p:cNvCxnSpPr/>
-          <p:nvPr/>
-        </p:nvCxnSpPr>
-        <p:spPr>
-          <a:xfrm flipH="1">
-            <a:off x="5621214" y="4124147"/>
-            <a:ext cx="275490" cy="332905"/>
-          </a:xfrm>
-          <a:prstGeom prst="straightConnector1">
-            <a:avLst/>
-          </a:prstGeom>
-          <a:ln>
-            <a:tailEnd type="triangle"/>
-          </a:ln>
-        </p:spPr>
-        <p:style>
-          <a:lnRef idx="1">
-            <a:schemeClr val="accent1"/>
-          </a:lnRef>
-          <a:fillRef idx="0">
-            <a:schemeClr val="accent1"/>
-          </a:fillRef>
-          <a:effectRef idx="0">
-            <a:schemeClr val="accent1"/>
-          </a:effectRef>
-          <a:fontRef idx="minor">
-            <a:schemeClr val="tx1"/>
-          </a:fontRef>
-        </p:style>
-      </p:cxnSp>
-      <p:cxnSp>
-        <p:nvCxnSpPr>
-          <p:cNvPr id="47" name="Straight Arrow Connector 46"/>
-          <p:cNvCxnSpPr/>
-          <p:nvPr/>
-        </p:nvCxnSpPr>
-        <p:spPr>
-          <a:xfrm flipH="1">
-            <a:off x="6676286" y="4968206"/>
-            <a:ext cx="275490" cy="332905"/>
-          </a:xfrm>
-          <a:prstGeom prst="straightConnector1">
-            <a:avLst/>
-          </a:prstGeom>
-          <a:ln>
-            <a:tailEnd type="triangle"/>
-          </a:ln>
-        </p:spPr>
-        <p:style>
-          <a:lnRef idx="1">
-            <a:schemeClr val="accent1"/>
-          </a:lnRef>
-          <a:fillRef idx="0">
-            <a:schemeClr val="accent1"/>
-          </a:fillRef>
-          <a:effectRef idx="0">
-            <a:schemeClr val="accent1"/>
-          </a:effectRef>
-          <a:fontRef idx="minor">
-            <a:schemeClr val="tx1"/>
-          </a:fontRef>
-        </p:style>
-      </p:cxnSp>
-      <p:cxnSp>
-        <p:nvCxnSpPr>
-          <p:cNvPr id="48" name="Straight Arrow Connector 47"/>
-          <p:cNvCxnSpPr/>
-          <p:nvPr/>
-        </p:nvCxnSpPr>
-        <p:spPr>
-          <a:xfrm flipH="1">
-            <a:off x="2608389" y="4264823"/>
-            <a:ext cx="275490" cy="332905"/>
-          </a:xfrm>
-          <a:prstGeom prst="straightConnector1">
-            <a:avLst/>
-          </a:prstGeom>
-          <a:ln>
-            <a:tailEnd type="triangle"/>
-          </a:ln>
-        </p:spPr>
-        <p:style>
-          <a:lnRef idx="1">
-            <a:schemeClr val="accent1"/>
-          </a:lnRef>
-          <a:fillRef idx="0">
-            <a:schemeClr val="accent1"/>
-          </a:fillRef>
-          <a:effectRef idx="0">
-            <a:schemeClr val="accent1"/>
-          </a:effectRef>
-          <a:fontRef idx="minor">
-            <a:schemeClr val="tx1"/>
-          </a:fontRef>
-        </p:style>
-      </p:cxnSp>
-      <p:cxnSp>
-        <p:nvCxnSpPr>
-          <p:cNvPr id="49" name="Straight Arrow Connector 48"/>
-          <p:cNvCxnSpPr/>
-          <p:nvPr/>
-        </p:nvCxnSpPr>
-        <p:spPr>
-          <a:xfrm flipH="1">
-            <a:off x="3206264" y="5120610"/>
-            <a:ext cx="275490" cy="332905"/>
-          </a:xfrm>
-          <a:prstGeom prst="straightConnector1">
-            <a:avLst/>
-          </a:prstGeom>
-          <a:ln>
-            <a:tailEnd type="triangle"/>
-          </a:ln>
-        </p:spPr>
-        <p:style>
-          <a:lnRef idx="1">
-            <a:schemeClr val="accent1"/>
-          </a:lnRef>
-          <a:fillRef idx="0">
-            <a:schemeClr val="accent1"/>
-          </a:fillRef>
-          <a:effectRef idx="0">
-            <a:schemeClr val="accent1"/>
-          </a:effectRef>
-          <a:fontRef idx="minor">
-            <a:schemeClr val="tx1"/>
-          </a:fontRef>
-        </p:style>
-      </p:cxnSp>
-      <p:sp>
-        <p:nvSpPr>
-          <p:cNvPr id="50" name="TextBox 49"/>
-          <p:cNvSpPr txBox="1"/>
-          <p:nvPr/>
-        </p:nvSpPr>
-        <p:spPr>
-          <a:xfrm>
-            <a:off x="2520453" y="2410939"/>
-            <a:ext cx="339969" cy="369332"/>
-          </a:xfrm>
-          <a:prstGeom prst="rect">
-            <a:avLst/>
-          </a:prstGeom>
-          <a:noFill/>
-        </p:spPr>
-        <p:txBody>
-          <a:bodyPr wrap="square" rtlCol="0">
-            <a:spAutoFit/>
-          </a:bodyPr>
-          <a:lstStyle/>
-          <a:p>
-            <a:r>
-              <a:rPr lang="en-US" dirty="0"/>
-              <a:t>A</a:t>
-            </a:r>
-          </a:p>
-        </p:txBody>
-      </p:sp>
-      <p:sp>
-        <p:nvSpPr>
-          <p:cNvPr id="51" name="TextBox 50"/>
-          <p:cNvSpPr txBox="1"/>
-          <p:nvPr/>
-        </p:nvSpPr>
-        <p:spPr>
-          <a:xfrm>
-            <a:off x="3781907" y="2341837"/>
-            <a:ext cx="785434" cy="369332"/>
-          </a:xfrm>
-          <a:prstGeom prst="rect">
-            <a:avLst/>
-          </a:prstGeom>
-          <a:noFill/>
-        </p:spPr>
-        <p:txBody>
-          <a:bodyPr wrap="square" rtlCol="0">
-            <a:spAutoFit/>
-          </a:bodyPr>
-          <a:lstStyle/>
-          <a:p>
-            <a:r>
-              <a:rPr lang="en-US" dirty="0"/>
-              <a:t>B</a:t>
-            </a:r>
-          </a:p>
-        </p:txBody>
-      </p:sp>
-      <p:sp>
-        <p:nvSpPr>
-          <p:cNvPr id="52" name="TextBox 51"/>
-          <p:cNvSpPr txBox="1"/>
-          <p:nvPr/>
-        </p:nvSpPr>
-        <p:spPr>
-          <a:xfrm>
-            <a:off x="5233118" y="3208361"/>
-            <a:ext cx="339969" cy="369332"/>
-          </a:xfrm>
-          <a:prstGeom prst="rect">
-            <a:avLst/>
-          </a:prstGeom>
-          <a:noFill/>
-        </p:spPr>
-        <p:txBody>
-          <a:bodyPr wrap="square" rtlCol="0">
-            <a:spAutoFit/>
-          </a:bodyPr>
-          <a:lstStyle/>
-          <a:p>
-            <a:r>
-              <a:rPr lang="en-US" dirty="0"/>
-              <a:t>A</a:t>
-            </a:r>
-          </a:p>
-        </p:txBody>
-      </p:sp>
-      <p:sp>
-        <p:nvSpPr>
-          <p:cNvPr id="53" name="TextBox 52"/>
-          <p:cNvSpPr txBox="1"/>
-          <p:nvPr/>
-        </p:nvSpPr>
-        <p:spPr>
-          <a:xfrm>
-            <a:off x="3311769" y="4145669"/>
-            <a:ext cx="339969" cy="369332"/>
-          </a:xfrm>
-          <a:prstGeom prst="rect">
-            <a:avLst/>
-          </a:prstGeom>
-          <a:noFill/>
-        </p:spPr>
-        <p:txBody>
-          <a:bodyPr wrap="square" rtlCol="0">
-            <a:spAutoFit/>
-          </a:bodyPr>
-          <a:lstStyle/>
-          <a:p>
-            <a:r>
-              <a:rPr lang="en-US" dirty="0"/>
-              <a:t>A</a:t>
-            </a:r>
-          </a:p>
-        </p:txBody>
-      </p:sp>
-      <p:sp>
-        <p:nvSpPr>
-          <p:cNvPr id="54" name="TextBox 53"/>
-          <p:cNvSpPr txBox="1"/>
-          <p:nvPr/>
-        </p:nvSpPr>
-        <p:spPr>
-          <a:xfrm>
-            <a:off x="2520453" y="3231466"/>
-            <a:ext cx="785434" cy="369332"/>
-          </a:xfrm>
-          <a:prstGeom prst="rect">
-            <a:avLst/>
-          </a:prstGeom>
-          <a:noFill/>
-        </p:spPr>
-        <p:txBody>
-          <a:bodyPr wrap="square" rtlCol="0">
-            <a:spAutoFit/>
-          </a:bodyPr>
-          <a:lstStyle/>
-          <a:p>
-            <a:r>
-              <a:rPr lang="en-US" dirty="0"/>
-              <a:t>B</a:t>
-            </a:r>
-          </a:p>
-        </p:txBody>
-      </p:sp>
-      <p:sp>
-        <p:nvSpPr>
-          <p:cNvPr id="55" name="TextBox 54"/>
-          <p:cNvSpPr txBox="1"/>
-          <p:nvPr/>
-        </p:nvSpPr>
-        <p:spPr>
-          <a:xfrm>
-            <a:off x="6476981" y="4000851"/>
-            <a:ext cx="785434" cy="369332"/>
-          </a:xfrm>
-          <a:prstGeom prst="rect">
-            <a:avLst/>
-          </a:prstGeom>
-          <a:noFill/>
-        </p:spPr>
-        <p:txBody>
-          <a:bodyPr wrap="square" rtlCol="0">
-            <a:spAutoFit/>
-          </a:bodyPr>
-          <a:lstStyle/>
-          <a:p>
-            <a:r>
-              <a:rPr lang="en-US" dirty="0"/>
-              <a:t>B</a:t>
-            </a:r>
-          </a:p>
-        </p:txBody>
-      </p:sp>
-      <p:sp>
-        <p:nvSpPr>
-          <p:cNvPr id="56" name="TextBox 55"/>
-          <p:cNvSpPr txBox="1"/>
-          <p:nvPr/>
-        </p:nvSpPr>
-        <p:spPr>
-          <a:xfrm>
-            <a:off x="1164191" y="3747447"/>
-            <a:ext cx="896819" cy="369332"/>
-          </a:xfrm>
-          <a:prstGeom prst="rect">
-            <a:avLst/>
-          </a:prstGeom>
-          <a:noFill/>
-        </p:spPr>
-        <p:txBody>
-          <a:bodyPr wrap="square" rtlCol="0">
-            <a:spAutoFit/>
-          </a:bodyPr>
-          <a:lstStyle/>
-          <a:p>
-            <a:r>
-              <a:rPr lang="en-US" dirty="0">
-                <a:solidFill>
-                  <a:schemeClr val="bg1"/>
-                </a:solidFill>
-              </a:rPr>
-              <a:t>1:3</a:t>
-            </a:r>
-          </a:p>
-        </p:txBody>
-      </p:sp>
-      <p:sp>
-        <p:nvSpPr>
-          <p:cNvPr id="57" name="TextBox 56"/>
-          <p:cNvSpPr txBox="1"/>
-          <p:nvPr/>
-        </p:nvSpPr>
-        <p:spPr>
-          <a:xfrm>
-            <a:off x="3789482" y="3770725"/>
-            <a:ext cx="896819" cy="369332"/>
-          </a:xfrm>
-          <a:prstGeom prst="rect">
-            <a:avLst/>
-          </a:prstGeom>
-          <a:noFill/>
-        </p:spPr>
-        <p:txBody>
-          <a:bodyPr wrap="square" rtlCol="0">
-            <a:spAutoFit/>
-          </a:bodyPr>
-          <a:lstStyle/>
-          <a:p>
-            <a:r>
-              <a:rPr lang="en-US" dirty="0">
-                <a:solidFill>
-                  <a:schemeClr val="bg1"/>
-                </a:solidFill>
-              </a:rPr>
-              <a:t>0:3</a:t>
-            </a:r>
-          </a:p>
-        </p:txBody>
-      </p:sp>
-      <p:sp>
-        <p:nvSpPr>
-          <p:cNvPr id="58" name="TextBox 57"/>
-          <p:cNvSpPr txBox="1"/>
-          <p:nvPr/>
-        </p:nvSpPr>
-        <p:spPr>
-          <a:xfrm>
-            <a:off x="2212207" y="4743791"/>
-            <a:ext cx="896819" cy="369332"/>
-          </a:xfrm>
-          <a:prstGeom prst="rect">
-            <a:avLst/>
-          </a:prstGeom>
-          <a:noFill/>
-        </p:spPr>
-        <p:txBody>
-          <a:bodyPr wrap="square" rtlCol="0">
-            <a:spAutoFit/>
-          </a:bodyPr>
-          <a:lstStyle/>
-          <a:p>
-            <a:r>
-              <a:rPr lang="en-US" dirty="0">
-                <a:solidFill>
-                  <a:schemeClr val="bg1"/>
-                </a:solidFill>
-              </a:rPr>
-              <a:t>0:2</a:t>
-            </a:r>
-          </a:p>
-        </p:txBody>
-      </p:sp>
-      <p:sp>
-        <p:nvSpPr>
-          <p:cNvPr id="59" name="TextBox 58"/>
-          <p:cNvSpPr txBox="1"/>
-          <p:nvPr/>
-        </p:nvSpPr>
-        <p:spPr>
-          <a:xfrm>
-            <a:off x="2796467" y="5575189"/>
-            <a:ext cx="896819" cy="369332"/>
-          </a:xfrm>
-          <a:prstGeom prst="rect">
-            <a:avLst/>
-          </a:prstGeom>
-          <a:noFill/>
-        </p:spPr>
-        <p:txBody>
-          <a:bodyPr wrap="square" rtlCol="0">
-            <a:spAutoFit/>
-          </a:bodyPr>
-          <a:lstStyle/>
-          <a:p>
-            <a:r>
-              <a:rPr lang="en-US" dirty="0">
-                <a:solidFill>
-                  <a:schemeClr val="bg1"/>
-                </a:solidFill>
-              </a:rPr>
-              <a:t>1:1</a:t>
-            </a:r>
-          </a:p>
-        </p:txBody>
-      </p:sp>
-      <p:sp>
-        <p:nvSpPr>
-          <p:cNvPr id="60" name="TextBox 59"/>
-          <p:cNvSpPr txBox="1"/>
-          <p:nvPr/>
-        </p:nvSpPr>
-        <p:spPr>
-          <a:xfrm>
-            <a:off x="4347098" y="5575189"/>
-            <a:ext cx="896819" cy="369332"/>
-          </a:xfrm>
-          <a:prstGeom prst="rect">
-            <a:avLst/>
-          </a:prstGeom>
-          <a:noFill/>
-        </p:spPr>
-        <p:txBody>
-          <a:bodyPr wrap="square" rtlCol="0">
-            <a:spAutoFit/>
-          </a:bodyPr>
-          <a:lstStyle/>
-          <a:p>
-            <a:r>
-              <a:rPr lang="en-US" dirty="0">
-                <a:solidFill>
-                  <a:schemeClr val="bg1"/>
-                </a:solidFill>
-              </a:rPr>
-              <a:t>0:0</a:t>
-            </a:r>
-          </a:p>
-        </p:txBody>
-      </p:sp>
-      <p:sp>
-        <p:nvSpPr>
-          <p:cNvPr id="61" name="TextBox 60"/>
-          <p:cNvSpPr txBox="1"/>
-          <p:nvPr/>
-        </p:nvSpPr>
-        <p:spPr>
-          <a:xfrm>
-            <a:off x="6246712" y="5469748"/>
-            <a:ext cx="896819" cy="369332"/>
-          </a:xfrm>
-          <a:prstGeom prst="rect">
-            <a:avLst/>
-          </a:prstGeom>
-          <a:noFill/>
-        </p:spPr>
-        <p:txBody>
-          <a:bodyPr wrap="square" rtlCol="0">
-            <a:spAutoFit/>
-          </a:bodyPr>
-          <a:lstStyle/>
-          <a:p>
-            <a:r>
-              <a:rPr lang="en-US" dirty="0">
-                <a:solidFill>
-                  <a:schemeClr val="bg1"/>
-                </a:solidFill>
-              </a:rPr>
-              <a:t>0:1</a:t>
-            </a:r>
-          </a:p>
-        </p:txBody>
-      </p:sp>
-      <p:sp>
-        <p:nvSpPr>
-          <p:cNvPr id="62" name="TextBox 61"/>
-          <p:cNvSpPr txBox="1"/>
-          <p:nvPr/>
-        </p:nvSpPr>
-        <p:spPr>
-          <a:xfrm>
-            <a:off x="8012713" y="5470537"/>
-            <a:ext cx="896819" cy="369332"/>
-          </a:xfrm>
-          <a:prstGeom prst="rect">
-            <a:avLst/>
-          </a:prstGeom>
-          <a:noFill/>
-        </p:spPr>
-        <p:txBody>
-          <a:bodyPr wrap="square" rtlCol="0">
-            <a:spAutoFit/>
-          </a:bodyPr>
-          <a:lstStyle/>
-          <a:p>
-            <a:r>
-              <a:rPr lang="en-US" dirty="0">
-                <a:solidFill>
-                  <a:schemeClr val="bg1"/>
-                </a:solidFill>
-              </a:rPr>
-              <a:t>1:0</a:t>
-            </a:r>
-          </a:p>
-        </p:txBody>
-      </p:sp>
-      <p:sp>
-        <p:nvSpPr>
-          <p:cNvPr id="63" name="TextBox 62"/>
-          <p:cNvSpPr txBox="1"/>
-          <p:nvPr/>
-        </p:nvSpPr>
-        <p:spPr>
-          <a:xfrm>
-            <a:off x="5172779" y="4545979"/>
-            <a:ext cx="896819" cy="369332"/>
-          </a:xfrm>
-          <a:prstGeom prst="rect">
-            <a:avLst/>
-          </a:prstGeom>
-          <a:noFill/>
-        </p:spPr>
-        <p:txBody>
-          <a:bodyPr wrap="square" rtlCol="0">
-            <a:spAutoFit/>
-          </a:bodyPr>
-          <a:lstStyle/>
-          <a:p>
-            <a:r>
-              <a:rPr lang="en-US" dirty="0">
-                <a:solidFill>
-                  <a:schemeClr val="bg1"/>
-                </a:solidFill>
-              </a:rPr>
-              <a:t>1:2</a:t>
-            </a:r>
-          </a:p>
-        </p:txBody>
-      </p:sp>
-      <p:sp>
-        <p:nvSpPr>
-          <p:cNvPr id="64" name="TextBox 63"/>
-          <p:cNvSpPr txBox="1"/>
-          <p:nvPr/>
-        </p:nvSpPr>
-        <p:spPr>
-          <a:xfrm>
-            <a:off x="1652434" y="3177575"/>
-            <a:ext cx="1473494" cy="369332"/>
-          </a:xfrm>
-          <a:prstGeom prst="rect">
-            <a:avLst/>
-          </a:prstGeom>
-          <a:noFill/>
-        </p:spPr>
-        <p:txBody>
-          <a:bodyPr wrap="square" rtlCol="0">
-            <a:spAutoFit/>
-          </a:bodyPr>
-          <a:lstStyle/>
-          <a:p>
-            <a:r>
-              <a:rPr lang="en-US" dirty="0"/>
-              <a:t>$1</a:t>
-            </a:r>
-          </a:p>
-        </p:txBody>
-      </p:sp>
-      <p:sp>
-        <p:nvSpPr>
-          <p:cNvPr id="66" name="TextBox 65"/>
-          <p:cNvSpPr txBox="1"/>
-          <p:nvPr/>
-        </p:nvSpPr>
-        <p:spPr>
-          <a:xfrm>
-            <a:off x="4053867" y="3257346"/>
-            <a:ext cx="1473494" cy="369332"/>
-          </a:xfrm>
-          <a:prstGeom prst="rect">
-            <a:avLst/>
-          </a:prstGeom>
-          <a:noFill/>
-        </p:spPr>
-        <p:txBody>
-          <a:bodyPr wrap="square" rtlCol="0">
-            <a:spAutoFit/>
-          </a:bodyPr>
-          <a:lstStyle/>
-          <a:p>
-            <a:r>
-              <a:rPr lang="en-US" dirty="0"/>
-              <a:t>$0</a:t>
-            </a:r>
-          </a:p>
-        </p:txBody>
-      </p:sp>
-      <p:sp>
-        <p:nvSpPr>
-          <p:cNvPr id="67" name="TextBox 66"/>
-          <p:cNvSpPr txBox="1"/>
-          <p:nvPr/>
-        </p:nvSpPr>
-        <p:spPr>
-          <a:xfrm>
-            <a:off x="5464747" y="4000297"/>
-            <a:ext cx="1473494" cy="369332"/>
-          </a:xfrm>
-          <a:prstGeom prst="rect">
-            <a:avLst/>
-          </a:prstGeom>
-          <a:noFill/>
-        </p:spPr>
-        <p:txBody>
-          <a:bodyPr wrap="square" rtlCol="0">
-            <a:spAutoFit/>
-          </a:bodyPr>
-          <a:lstStyle/>
-          <a:p>
-            <a:r>
-              <a:rPr lang="en-US" dirty="0"/>
-              <a:t>$1</a:t>
-            </a:r>
-          </a:p>
-        </p:txBody>
-      </p:sp>
-      <p:sp>
-        <p:nvSpPr>
-          <p:cNvPr id="68" name="TextBox 67"/>
-          <p:cNvSpPr txBox="1"/>
-          <p:nvPr/>
-        </p:nvSpPr>
-        <p:spPr>
-          <a:xfrm>
-            <a:off x="3093847" y="4982782"/>
-            <a:ext cx="1473494" cy="369332"/>
-          </a:xfrm>
-          <a:prstGeom prst="rect">
-            <a:avLst/>
-          </a:prstGeom>
-          <a:noFill/>
-        </p:spPr>
-        <p:txBody>
-          <a:bodyPr wrap="square" rtlCol="0">
-            <a:spAutoFit/>
-          </a:bodyPr>
-          <a:lstStyle/>
-          <a:p>
-            <a:r>
-              <a:rPr lang="en-US" dirty="0"/>
-              <a:t>$1</a:t>
-            </a:r>
-          </a:p>
-        </p:txBody>
-      </p:sp>
-      <p:sp>
-        <p:nvSpPr>
-          <p:cNvPr id="69" name="TextBox 68"/>
-          <p:cNvSpPr txBox="1"/>
-          <p:nvPr/>
-        </p:nvSpPr>
-        <p:spPr>
-          <a:xfrm>
-            <a:off x="7510387" y="4889052"/>
-            <a:ext cx="1473494" cy="369332"/>
-          </a:xfrm>
-          <a:prstGeom prst="rect">
-            <a:avLst/>
-          </a:prstGeom>
-          <a:noFill/>
-        </p:spPr>
-        <p:txBody>
-          <a:bodyPr wrap="square" rtlCol="0">
-            <a:spAutoFit/>
-          </a:bodyPr>
-          <a:lstStyle/>
-          <a:p>
-            <a:r>
-              <a:rPr lang="en-US" dirty="0"/>
-              <a:t>$1</a:t>
-            </a:r>
-          </a:p>
-        </p:txBody>
-      </p:sp>
-      <p:sp>
-        <p:nvSpPr>
-          <p:cNvPr id="70" name="TextBox 69"/>
-          <p:cNvSpPr txBox="1"/>
-          <p:nvPr/>
-        </p:nvSpPr>
-        <p:spPr>
-          <a:xfrm>
-            <a:off x="2458373" y="4148282"/>
-            <a:ext cx="1473494" cy="369332"/>
-          </a:xfrm>
-          <a:prstGeom prst="rect">
-            <a:avLst/>
-          </a:prstGeom>
-          <a:noFill/>
-        </p:spPr>
-        <p:txBody>
-          <a:bodyPr wrap="square" rtlCol="0">
-            <a:spAutoFit/>
-          </a:bodyPr>
-          <a:lstStyle/>
-          <a:p>
-            <a:r>
-              <a:rPr lang="en-US" dirty="0"/>
-              <a:t>$0</a:t>
-            </a:r>
-          </a:p>
-        </p:txBody>
-      </p:sp>
-      <p:sp>
-        <p:nvSpPr>
-          <p:cNvPr id="71" name="TextBox 70"/>
-          <p:cNvSpPr txBox="1"/>
-          <p:nvPr/>
-        </p:nvSpPr>
-        <p:spPr>
-          <a:xfrm>
-            <a:off x="6503422" y="4873091"/>
-            <a:ext cx="1473494" cy="369332"/>
-          </a:xfrm>
-          <a:prstGeom prst="rect">
-            <a:avLst/>
-          </a:prstGeom>
-          <a:noFill/>
-        </p:spPr>
-        <p:txBody>
-          <a:bodyPr wrap="square" rtlCol="0">
-            <a:spAutoFit/>
-          </a:bodyPr>
-          <a:lstStyle/>
-          <a:p>
-            <a:r>
-              <a:rPr lang="en-US" dirty="0"/>
-              <a:t>$0</a:t>
-            </a:r>
-          </a:p>
-        </p:txBody>
-      </p:sp>
-      <p:pic>
-        <p:nvPicPr>
-          <p:cNvPr id="72" name="Picture 71"/>
-          <p:cNvPicPr>
-            <a:picLocks noChangeAspect="1"/>
-          </p:cNvPicPr>
-          <p:nvPr/>
-        </p:nvPicPr>
-        <p:blipFill>
-          <a:blip r:embed="rId2"/>
-          <a:stretch>
-            <a:fillRect/>
-          </a:stretch>
-        </p:blipFill>
-        <p:spPr>
-          <a:xfrm>
-            <a:off x="7096414" y="3164649"/>
-            <a:ext cx="1889984" cy="413043"/>
-          </a:xfrm>
-          <a:prstGeom prst="rect">
-            <a:avLst/>
-          </a:prstGeom>
-        </p:spPr>
-      </p:pic>
-      <p:sp>
-        <p:nvSpPr>
-          <p:cNvPr id="73" name="TextBox 72"/>
-          <p:cNvSpPr txBox="1"/>
-          <p:nvPr/>
-        </p:nvSpPr>
-        <p:spPr>
-          <a:xfrm>
-            <a:off x="9214338" y="3208361"/>
-            <a:ext cx="2015123" cy="369332"/>
-          </a:xfrm>
-          <a:prstGeom prst="rect">
-            <a:avLst/>
-          </a:prstGeom>
-          <a:noFill/>
-        </p:spPr>
-        <p:txBody>
-          <a:bodyPr wrap="square" rtlCol="0">
-            <a:spAutoFit/>
-          </a:bodyPr>
-          <a:lstStyle/>
-          <a:p>
-            <a:r>
-              <a:rPr lang="fa-IR" dirty="0"/>
-              <a:t>پیدا کردن همه جواب ها:</a:t>
-            </a:r>
-            <a:endParaRPr lang="en-US" dirty="0"/>
-          </a:p>
-        </p:txBody>
-      </p:sp>
-      <p:pic>
-        <p:nvPicPr>
-          <p:cNvPr id="74" name="Picture 73"/>
-          <p:cNvPicPr>
-            <a:picLocks noChangeAspect="1"/>
-          </p:cNvPicPr>
-          <p:nvPr/>
-        </p:nvPicPr>
-        <p:blipFill>
-          <a:blip r:embed="rId3"/>
-          <a:stretch>
-            <a:fillRect/>
-          </a:stretch>
-        </p:blipFill>
-        <p:spPr>
-          <a:xfrm>
-            <a:off x="8446460" y="4116779"/>
-            <a:ext cx="3220029" cy="464148"/>
-          </a:xfrm>
-          <a:prstGeom prst="rect">
-            <a:avLst/>
-          </a:prstGeom>
-        </p:spPr>
-      </p:pic>
-    </p:spTree>
-    <p:extLst>
-      <p:ext uri="{BB962C8B-B14F-4D97-AF65-F5344CB8AC3E}">
-        <p14:creationId xmlns:p14="http://schemas.microsoft.com/office/powerpoint/2010/main" val="2867097691"/>
-      </p:ext>
-    </p:extLst>
-  </p:cSld>
-  <p:clrMapOvr>
-    <a:masterClrMapping/>
-  </p:clrMapOvr>
   <mc:AlternateContent xmlns:mc="http://schemas.openxmlformats.org/markup-compatibility/2006" xmlns:p14="http://schemas.microsoft.com/office/powerpoint/2010/main">
     <mc:Choice Requires="p14">
       <p:transition spd="med" p14:dur="700">
@@ -8162,47 +6306,1298 @@
         </p:nvSpPr>
         <p:spPr>
           <a:xfrm>
-            <a:off x="1097280" y="227988"/>
-            <a:ext cx="10058400" cy="1450757"/>
-          </a:xfrm>
-        </p:spPr>
-        <p:txBody>
-          <a:bodyPr/>
+            <a:off x="6069598" y="679269"/>
+            <a:ext cx="5086082" cy="1058091"/>
+          </a:xfrm>
+        </p:spPr>
+        <p:txBody>
+          <a:bodyPr>
+            <a:normAutofit/>
+          </a:bodyPr>
           <a:lstStyle/>
           <a:p>
             <a:pPr algn="r"/>
             <a:r>
-              <a:rPr lang="fa-IR" dirty="0">
-                <a:solidFill>
-                  <a:schemeClr val="tx1">
-                    <a:lumMod val="95000"/>
-                    <a:lumOff val="5000"/>
-                  </a:schemeClr>
-                </a:solidFill>
-              </a:rPr>
-              <a:t>طولانی ترین زیر رشته مشترک</a:t>
-            </a:r>
-            <a:endParaRPr lang="en-US" dirty="0">
-              <a:solidFill>
-                <a:schemeClr val="tx1">
-                  <a:lumMod val="95000"/>
-                  <a:lumOff val="5000"/>
-                </a:schemeClr>
-              </a:solidFill>
-            </a:endParaRPr>
-          </a:p>
-        </p:txBody>
-      </p:sp>
-      <p:sp>
-        <p:nvSpPr>
-          <p:cNvPr id="3" name="TextBox 2"/>
+              <a:rPr lang="fa-IR" dirty="0"/>
+              <a:t>کاربرد ها و مرتبه زمانی</a:t>
+            </a:r>
+            <a:endParaRPr lang="en-US" dirty="0"/>
+          </a:p>
+        </p:txBody>
+      </p:sp>
+      <p:sp>
+        <p:nvSpPr>
+          <p:cNvPr id="5" name="Rectangle 4"/>
+          <p:cNvSpPr/>
+          <p:nvPr/>
+        </p:nvSpPr>
+        <p:spPr>
+          <a:xfrm>
+            <a:off x="6315272" y="2255840"/>
+            <a:ext cx="4840408" cy="584775"/>
+          </a:xfrm>
+          <a:prstGeom prst="rect">
+            <a:avLst/>
+          </a:prstGeom>
+        </p:spPr>
+        <p:txBody>
+          <a:bodyPr wrap="square">
+            <a:spAutoFit/>
+          </a:bodyPr>
+          <a:lstStyle/>
+          <a:p>
+            <a:pPr algn="r"/>
+            <a:r>
+              <a:rPr lang="fa-IR" sz="3200" dirty="0"/>
+              <a:t>مسئله1: تطابق رشته کامل</a:t>
+            </a:r>
+            <a:endParaRPr lang="en-US" sz="3200" dirty="0"/>
+          </a:p>
+        </p:txBody>
+      </p:sp>
+      <p:sp>
+        <p:nvSpPr>
+          <p:cNvPr id="6" name="Oval 5"/>
+          <p:cNvSpPr/>
+          <p:nvPr/>
+        </p:nvSpPr>
+        <p:spPr>
+          <a:xfrm>
+            <a:off x="3200391" y="2211615"/>
+            <a:ext cx="339969" cy="298086"/>
+          </a:xfrm>
+          <a:prstGeom prst="ellipse">
+            <a:avLst/>
+          </a:prstGeom>
+          <a:solidFill>
+            <a:schemeClr val="accent1">
+              <a:lumMod val="50000"/>
+            </a:schemeClr>
+          </a:solidFill>
+        </p:spPr>
+        <p:style>
+          <a:lnRef idx="2">
+            <a:schemeClr val="accent1">
+              <a:shade val="50000"/>
+            </a:schemeClr>
+          </a:lnRef>
+          <a:fillRef idx="1">
+            <a:schemeClr val="accent1"/>
+          </a:fillRef>
+          <a:effectRef idx="0">
+            <a:schemeClr val="accent1"/>
+          </a:effectRef>
+          <a:fontRef idx="minor">
+            <a:schemeClr val="lt1"/>
+          </a:fontRef>
+        </p:style>
+        <p:txBody>
+          <a:bodyPr rtlCol="0" anchor="ctr"/>
+          <a:lstStyle/>
+          <a:p>
+            <a:pPr algn="ctr"/>
+            <a:endParaRPr lang="en-US"/>
+          </a:p>
+        </p:txBody>
+      </p:sp>
+      <p:sp>
+        <p:nvSpPr>
+          <p:cNvPr id="7" name="Oval 6"/>
+          <p:cNvSpPr/>
+          <p:nvPr/>
+        </p:nvSpPr>
+        <p:spPr>
+          <a:xfrm>
+            <a:off x="2127741" y="3016185"/>
+            <a:ext cx="339969" cy="298086"/>
+          </a:xfrm>
+          <a:prstGeom prst="ellipse">
+            <a:avLst/>
+          </a:prstGeom>
+          <a:solidFill>
+            <a:schemeClr val="accent1">
+              <a:lumMod val="50000"/>
+            </a:schemeClr>
+          </a:solidFill>
+        </p:spPr>
+        <p:style>
+          <a:lnRef idx="2">
+            <a:schemeClr val="accent1">
+              <a:shade val="50000"/>
+            </a:schemeClr>
+          </a:lnRef>
+          <a:fillRef idx="1">
+            <a:schemeClr val="accent1"/>
+          </a:fillRef>
+          <a:effectRef idx="0">
+            <a:schemeClr val="accent1"/>
+          </a:effectRef>
+          <a:fontRef idx="minor">
+            <a:schemeClr val="lt1"/>
+          </a:fontRef>
+        </p:style>
+        <p:txBody>
+          <a:bodyPr rtlCol="0" anchor="ctr"/>
+          <a:lstStyle/>
+          <a:p>
+            <a:pPr algn="ctr"/>
+            <a:endParaRPr lang="en-US"/>
+          </a:p>
+        </p:txBody>
+      </p:sp>
+      <p:sp>
+        <p:nvSpPr>
+          <p:cNvPr id="8" name="Oval 7"/>
+          <p:cNvSpPr/>
+          <p:nvPr/>
+        </p:nvSpPr>
+        <p:spPr>
+          <a:xfrm>
+            <a:off x="4513382" y="3016185"/>
+            <a:ext cx="339969" cy="298086"/>
+          </a:xfrm>
+          <a:prstGeom prst="ellipse">
+            <a:avLst/>
+          </a:prstGeom>
+          <a:solidFill>
+            <a:schemeClr val="accent1">
+              <a:lumMod val="50000"/>
+            </a:schemeClr>
+          </a:solidFill>
+        </p:spPr>
+        <p:style>
+          <a:lnRef idx="2">
+            <a:schemeClr val="accent1">
+              <a:shade val="50000"/>
+            </a:schemeClr>
+          </a:lnRef>
+          <a:fillRef idx="1">
+            <a:schemeClr val="accent1"/>
+          </a:fillRef>
+          <a:effectRef idx="0">
+            <a:schemeClr val="accent1"/>
+          </a:effectRef>
+          <a:fontRef idx="minor">
+            <a:schemeClr val="lt1"/>
+          </a:fontRef>
+        </p:style>
+        <p:txBody>
+          <a:bodyPr rtlCol="0" anchor="ctr"/>
+          <a:lstStyle/>
+          <a:p>
+            <a:pPr algn="ctr"/>
+            <a:endParaRPr lang="en-US"/>
+          </a:p>
+        </p:txBody>
+      </p:sp>
+      <p:sp>
+        <p:nvSpPr>
+          <p:cNvPr id="9" name="Oval 8"/>
+          <p:cNvSpPr/>
+          <p:nvPr/>
+        </p:nvSpPr>
+        <p:spPr>
+          <a:xfrm>
+            <a:off x="2861681" y="3850685"/>
+            <a:ext cx="339969" cy="298086"/>
+          </a:xfrm>
+          <a:prstGeom prst="ellipse">
+            <a:avLst/>
+          </a:prstGeom>
+          <a:solidFill>
+            <a:schemeClr val="accent1">
+              <a:lumMod val="50000"/>
+            </a:schemeClr>
+          </a:solidFill>
+        </p:spPr>
+        <p:style>
+          <a:lnRef idx="2">
+            <a:schemeClr val="accent1">
+              <a:shade val="50000"/>
+            </a:schemeClr>
+          </a:lnRef>
+          <a:fillRef idx="1">
+            <a:schemeClr val="accent1"/>
+          </a:fillRef>
+          <a:effectRef idx="0">
+            <a:schemeClr val="accent1"/>
+          </a:effectRef>
+          <a:fontRef idx="minor">
+            <a:schemeClr val="lt1"/>
+          </a:fontRef>
+        </p:style>
+        <p:txBody>
+          <a:bodyPr rtlCol="0" anchor="ctr"/>
+          <a:lstStyle/>
+          <a:p>
+            <a:pPr algn="ctr"/>
+            <a:endParaRPr lang="en-US"/>
+          </a:p>
+        </p:txBody>
+      </p:sp>
+      <p:sp>
+        <p:nvSpPr>
+          <p:cNvPr id="10" name="Oval 9"/>
+          <p:cNvSpPr/>
+          <p:nvPr/>
+        </p:nvSpPr>
+        <p:spPr>
+          <a:xfrm>
+            <a:off x="5854502" y="3749024"/>
+            <a:ext cx="339969" cy="298086"/>
+          </a:xfrm>
+          <a:prstGeom prst="ellipse">
+            <a:avLst/>
+          </a:prstGeom>
+          <a:solidFill>
+            <a:schemeClr val="accent1">
+              <a:lumMod val="50000"/>
+            </a:schemeClr>
+          </a:solidFill>
+          <a:ln>
+            <a:solidFill>
+              <a:schemeClr val="accent1">
+                <a:lumMod val="50000"/>
+              </a:schemeClr>
+            </a:solidFill>
+          </a:ln>
+        </p:spPr>
+        <p:style>
+          <a:lnRef idx="2">
+            <a:schemeClr val="accent1">
+              <a:shade val="50000"/>
+            </a:schemeClr>
+          </a:lnRef>
+          <a:fillRef idx="1">
+            <a:schemeClr val="accent1"/>
+          </a:fillRef>
+          <a:effectRef idx="0">
+            <a:schemeClr val="accent1"/>
+          </a:effectRef>
+          <a:fontRef idx="minor">
+            <a:schemeClr val="lt1"/>
+          </a:fontRef>
+        </p:style>
+        <p:txBody>
+          <a:bodyPr rtlCol="0" anchor="ctr"/>
+          <a:lstStyle/>
+          <a:p>
+            <a:pPr algn="ctr"/>
+            <a:endParaRPr lang="en-US"/>
+          </a:p>
+        </p:txBody>
+      </p:sp>
+      <p:sp>
+        <p:nvSpPr>
+          <p:cNvPr id="11" name="Oval 10"/>
+          <p:cNvSpPr/>
+          <p:nvPr/>
+        </p:nvSpPr>
+        <p:spPr>
+          <a:xfrm>
+            <a:off x="3519319" y="4777978"/>
+            <a:ext cx="339969" cy="298086"/>
+          </a:xfrm>
+          <a:prstGeom prst="ellipse">
+            <a:avLst/>
+          </a:prstGeom>
+          <a:solidFill>
+            <a:schemeClr val="accent1">
+              <a:lumMod val="50000"/>
+            </a:schemeClr>
+          </a:solidFill>
+        </p:spPr>
+        <p:style>
+          <a:lnRef idx="2">
+            <a:schemeClr val="accent1">
+              <a:shade val="50000"/>
+            </a:schemeClr>
+          </a:lnRef>
+          <a:fillRef idx="1">
+            <a:schemeClr val="accent1"/>
+          </a:fillRef>
+          <a:effectRef idx="0">
+            <a:schemeClr val="accent1"/>
+          </a:effectRef>
+          <a:fontRef idx="minor">
+            <a:schemeClr val="lt1"/>
+          </a:fontRef>
+        </p:style>
+        <p:txBody>
+          <a:bodyPr rtlCol="0" anchor="ctr"/>
+          <a:lstStyle/>
+          <a:p>
+            <a:pPr algn="ctr"/>
+            <a:endParaRPr lang="en-US"/>
+          </a:p>
+        </p:txBody>
+      </p:sp>
+      <p:sp>
+        <p:nvSpPr>
+          <p:cNvPr id="12" name="Oval 11"/>
+          <p:cNvSpPr/>
+          <p:nvPr/>
+        </p:nvSpPr>
+        <p:spPr>
+          <a:xfrm>
+            <a:off x="6969364" y="4617226"/>
+            <a:ext cx="339969" cy="298086"/>
+          </a:xfrm>
+          <a:prstGeom prst="ellipse">
+            <a:avLst/>
+          </a:prstGeom>
+          <a:solidFill>
+            <a:schemeClr val="accent1">
+              <a:lumMod val="50000"/>
+            </a:schemeClr>
+          </a:solidFill>
+        </p:spPr>
+        <p:style>
+          <a:lnRef idx="2">
+            <a:schemeClr val="accent1">
+              <a:shade val="50000"/>
+            </a:schemeClr>
+          </a:lnRef>
+          <a:fillRef idx="1">
+            <a:schemeClr val="accent1"/>
+          </a:fillRef>
+          <a:effectRef idx="0">
+            <a:schemeClr val="accent1"/>
+          </a:effectRef>
+          <a:fontRef idx="minor">
+            <a:schemeClr val="lt1"/>
+          </a:fontRef>
+        </p:style>
+        <p:txBody>
+          <a:bodyPr rtlCol="0" anchor="ctr"/>
+          <a:lstStyle/>
+          <a:p>
+            <a:pPr algn="ctr"/>
+            <a:endParaRPr lang="en-US"/>
+          </a:p>
+        </p:txBody>
+      </p:sp>
+      <p:sp>
+        <p:nvSpPr>
+          <p:cNvPr id="13" name="Rectangle 12"/>
+          <p:cNvSpPr/>
+          <p:nvPr/>
+        </p:nvSpPr>
+        <p:spPr>
+          <a:xfrm>
+            <a:off x="1230922" y="3767170"/>
+            <a:ext cx="339969" cy="378499"/>
+          </a:xfrm>
+          <a:prstGeom prst="rect">
+            <a:avLst/>
+          </a:prstGeom>
+          <a:solidFill>
+            <a:schemeClr val="accent1">
+              <a:lumMod val="50000"/>
+            </a:schemeClr>
+          </a:solidFill>
+          <a:ln>
+            <a:solidFill>
+              <a:schemeClr val="accent1">
+                <a:lumMod val="50000"/>
+              </a:schemeClr>
+            </a:solidFill>
+          </a:ln>
+        </p:spPr>
+        <p:style>
+          <a:lnRef idx="2">
+            <a:schemeClr val="accent1">
+              <a:shade val="50000"/>
+            </a:schemeClr>
+          </a:lnRef>
+          <a:fillRef idx="1">
+            <a:schemeClr val="accent1"/>
+          </a:fillRef>
+          <a:effectRef idx="0">
+            <a:schemeClr val="accent1"/>
+          </a:effectRef>
+          <a:fontRef idx="minor">
+            <a:schemeClr val="lt1"/>
+          </a:fontRef>
+        </p:style>
+        <p:txBody>
+          <a:bodyPr rtlCol="0" anchor="ctr"/>
+          <a:lstStyle/>
+          <a:p>
+            <a:pPr algn="ctr"/>
+            <a:endParaRPr lang="en-US"/>
+          </a:p>
+        </p:txBody>
+      </p:sp>
+      <p:sp>
+        <p:nvSpPr>
+          <p:cNvPr id="14" name="Rectangle 13"/>
+          <p:cNvSpPr/>
+          <p:nvPr/>
+        </p:nvSpPr>
+        <p:spPr>
+          <a:xfrm>
+            <a:off x="2268416" y="4726062"/>
+            <a:ext cx="339969" cy="378499"/>
+          </a:xfrm>
+          <a:prstGeom prst="rect">
+            <a:avLst/>
+          </a:prstGeom>
+          <a:solidFill>
+            <a:schemeClr val="accent1">
+              <a:lumMod val="50000"/>
+            </a:schemeClr>
+          </a:solidFill>
+          <a:ln>
+            <a:solidFill>
+              <a:schemeClr val="accent1">
+                <a:lumMod val="50000"/>
+              </a:schemeClr>
+            </a:solidFill>
+          </a:ln>
+        </p:spPr>
+        <p:style>
+          <a:lnRef idx="2">
+            <a:schemeClr val="accent1">
+              <a:shade val="50000"/>
+            </a:schemeClr>
+          </a:lnRef>
+          <a:fillRef idx="1">
+            <a:schemeClr val="accent1"/>
+          </a:fillRef>
+          <a:effectRef idx="0">
+            <a:schemeClr val="accent1"/>
+          </a:effectRef>
+          <a:fontRef idx="minor">
+            <a:schemeClr val="lt1"/>
+          </a:fontRef>
+        </p:style>
+        <p:txBody>
+          <a:bodyPr rtlCol="0" anchor="ctr"/>
+          <a:lstStyle/>
+          <a:p>
+            <a:pPr algn="ctr"/>
+            <a:endParaRPr lang="en-US"/>
+          </a:p>
+        </p:txBody>
+      </p:sp>
+      <p:sp>
+        <p:nvSpPr>
+          <p:cNvPr id="15" name="Rectangle 14"/>
+          <p:cNvSpPr/>
+          <p:nvPr/>
+        </p:nvSpPr>
+        <p:spPr>
+          <a:xfrm>
+            <a:off x="3859288" y="3776731"/>
+            <a:ext cx="339969" cy="378499"/>
+          </a:xfrm>
+          <a:prstGeom prst="rect">
+            <a:avLst/>
+          </a:prstGeom>
+          <a:solidFill>
+            <a:schemeClr val="accent1">
+              <a:lumMod val="50000"/>
+            </a:schemeClr>
+          </a:solidFill>
+          <a:ln>
+            <a:solidFill>
+              <a:schemeClr val="accent1">
+                <a:lumMod val="50000"/>
+              </a:schemeClr>
+            </a:solidFill>
+          </a:ln>
+        </p:spPr>
+        <p:style>
+          <a:lnRef idx="2">
+            <a:schemeClr val="accent1">
+              <a:shade val="50000"/>
+            </a:schemeClr>
+          </a:lnRef>
+          <a:fillRef idx="1">
+            <a:schemeClr val="accent1"/>
+          </a:fillRef>
+          <a:effectRef idx="0">
+            <a:schemeClr val="accent1"/>
+          </a:effectRef>
+          <a:fontRef idx="minor">
+            <a:schemeClr val="lt1"/>
+          </a:fontRef>
+        </p:style>
+        <p:txBody>
+          <a:bodyPr rtlCol="0" anchor="ctr"/>
+          <a:lstStyle/>
+          <a:p>
+            <a:pPr algn="ctr"/>
+            <a:endParaRPr lang="en-US"/>
+          </a:p>
+        </p:txBody>
+      </p:sp>
+      <p:sp>
+        <p:nvSpPr>
+          <p:cNvPr id="16" name="Rectangle 15"/>
+          <p:cNvSpPr/>
+          <p:nvPr/>
+        </p:nvSpPr>
+        <p:spPr>
+          <a:xfrm>
+            <a:off x="5234337" y="4548522"/>
+            <a:ext cx="339969" cy="378499"/>
+          </a:xfrm>
+          <a:prstGeom prst="rect">
+            <a:avLst/>
+          </a:prstGeom>
+          <a:solidFill>
+            <a:schemeClr val="accent1">
+              <a:lumMod val="50000"/>
+            </a:schemeClr>
+          </a:solidFill>
+          <a:ln>
+            <a:solidFill>
+              <a:schemeClr val="accent1">
+                <a:lumMod val="50000"/>
+              </a:schemeClr>
+            </a:solidFill>
+          </a:ln>
+        </p:spPr>
+        <p:style>
+          <a:lnRef idx="2">
+            <a:schemeClr val="accent1">
+              <a:shade val="50000"/>
+            </a:schemeClr>
+          </a:lnRef>
+          <a:fillRef idx="1">
+            <a:schemeClr val="accent1"/>
+          </a:fillRef>
+          <a:effectRef idx="0">
+            <a:schemeClr val="accent1"/>
+          </a:effectRef>
+          <a:fontRef idx="minor">
+            <a:schemeClr val="lt1"/>
+          </a:fontRef>
+        </p:style>
+        <p:txBody>
+          <a:bodyPr rtlCol="0" anchor="ctr"/>
+          <a:lstStyle/>
+          <a:p>
+            <a:pPr algn="ctr"/>
+            <a:endParaRPr lang="en-US"/>
+          </a:p>
+        </p:txBody>
+      </p:sp>
+      <p:sp>
+        <p:nvSpPr>
+          <p:cNvPr id="17" name="Rectangle 16"/>
+          <p:cNvSpPr/>
+          <p:nvPr/>
+        </p:nvSpPr>
+        <p:spPr>
+          <a:xfrm>
+            <a:off x="2825254" y="5588517"/>
+            <a:ext cx="339969" cy="378499"/>
+          </a:xfrm>
+          <a:prstGeom prst="rect">
+            <a:avLst/>
+          </a:prstGeom>
+          <a:solidFill>
+            <a:schemeClr val="accent1">
+              <a:lumMod val="50000"/>
+            </a:schemeClr>
+          </a:solidFill>
+          <a:ln>
+            <a:solidFill>
+              <a:schemeClr val="accent1">
+                <a:lumMod val="50000"/>
+              </a:schemeClr>
+            </a:solidFill>
+          </a:ln>
+        </p:spPr>
+        <p:style>
+          <a:lnRef idx="2">
+            <a:schemeClr val="accent1">
+              <a:shade val="50000"/>
+            </a:schemeClr>
+          </a:lnRef>
+          <a:fillRef idx="1">
+            <a:schemeClr val="accent1"/>
+          </a:fillRef>
+          <a:effectRef idx="0">
+            <a:schemeClr val="accent1"/>
+          </a:effectRef>
+          <a:fontRef idx="minor">
+            <a:schemeClr val="lt1"/>
+          </a:fontRef>
+        </p:style>
+        <p:txBody>
+          <a:bodyPr rtlCol="0" anchor="ctr"/>
+          <a:lstStyle/>
+          <a:p>
+            <a:pPr algn="ctr"/>
+            <a:endParaRPr lang="en-US"/>
+          </a:p>
+        </p:txBody>
+      </p:sp>
+      <p:sp>
+        <p:nvSpPr>
+          <p:cNvPr id="18" name="Rectangle 17"/>
+          <p:cNvSpPr/>
+          <p:nvPr/>
+        </p:nvSpPr>
+        <p:spPr>
+          <a:xfrm>
+            <a:off x="4411051" y="5583535"/>
+            <a:ext cx="339969" cy="378499"/>
+          </a:xfrm>
+          <a:prstGeom prst="rect">
+            <a:avLst/>
+          </a:prstGeom>
+          <a:solidFill>
+            <a:schemeClr val="accent1">
+              <a:lumMod val="50000"/>
+            </a:schemeClr>
+          </a:solidFill>
+          <a:ln>
+            <a:solidFill>
+              <a:schemeClr val="accent1">
+                <a:lumMod val="50000"/>
+              </a:schemeClr>
+            </a:solidFill>
+          </a:ln>
+        </p:spPr>
+        <p:style>
+          <a:lnRef idx="2">
+            <a:schemeClr val="accent1">
+              <a:shade val="50000"/>
+            </a:schemeClr>
+          </a:lnRef>
+          <a:fillRef idx="1">
+            <a:schemeClr val="accent1"/>
+          </a:fillRef>
+          <a:effectRef idx="0">
+            <a:schemeClr val="accent1"/>
+          </a:effectRef>
+          <a:fontRef idx="minor">
+            <a:schemeClr val="lt1"/>
+          </a:fontRef>
+        </p:style>
+        <p:txBody>
+          <a:bodyPr rtlCol="0" anchor="ctr"/>
+          <a:lstStyle/>
+          <a:p>
+            <a:pPr algn="ctr"/>
+            <a:endParaRPr lang="en-US"/>
+          </a:p>
+        </p:txBody>
+      </p:sp>
+      <p:sp>
+        <p:nvSpPr>
+          <p:cNvPr id="19" name="Rectangle 18"/>
+          <p:cNvSpPr/>
+          <p:nvPr/>
+        </p:nvSpPr>
+        <p:spPr>
+          <a:xfrm>
+            <a:off x="6301651" y="5454576"/>
+            <a:ext cx="339969" cy="378499"/>
+          </a:xfrm>
+          <a:prstGeom prst="rect">
+            <a:avLst/>
+          </a:prstGeom>
+          <a:solidFill>
+            <a:schemeClr val="accent1">
+              <a:lumMod val="50000"/>
+            </a:schemeClr>
+          </a:solidFill>
+          <a:ln>
+            <a:solidFill>
+              <a:schemeClr val="accent1">
+                <a:lumMod val="50000"/>
+              </a:schemeClr>
+            </a:solidFill>
+          </a:ln>
+        </p:spPr>
+        <p:style>
+          <a:lnRef idx="2">
+            <a:schemeClr val="accent1">
+              <a:shade val="50000"/>
+            </a:schemeClr>
+          </a:lnRef>
+          <a:fillRef idx="1">
+            <a:schemeClr val="accent1"/>
+          </a:fillRef>
+          <a:effectRef idx="0">
+            <a:schemeClr val="accent1"/>
+          </a:effectRef>
+          <a:fontRef idx="minor">
+            <a:schemeClr val="lt1"/>
+          </a:fontRef>
+        </p:style>
+        <p:txBody>
+          <a:bodyPr rtlCol="0" anchor="ctr"/>
+          <a:lstStyle/>
+          <a:p>
+            <a:pPr algn="ctr"/>
+            <a:endParaRPr lang="en-US"/>
+          </a:p>
+        </p:txBody>
+      </p:sp>
+      <p:sp>
+        <p:nvSpPr>
+          <p:cNvPr id="20" name="Rectangle 19"/>
+          <p:cNvSpPr/>
+          <p:nvPr/>
+        </p:nvSpPr>
+        <p:spPr>
+          <a:xfrm>
+            <a:off x="8077150" y="5489702"/>
+            <a:ext cx="339969" cy="378499"/>
+          </a:xfrm>
+          <a:prstGeom prst="rect">
+            <a:avLst/>
+          </a:prstGeom>
+          <a:solidFill>
+            <a:schemeClr val="accent1">
+              <a:lumMod val="50000"/>
+            </a:schemeClr>
+          </a:solidFill>
+          <a:ln>
+            <a:solidFill>
+              <a:schemeClr val="accent1">
+                <a:lumMod val="50000"/>
+              </a:schemeClr>
+            </a:solidFill>
+          </a:ln>
+        </p:spPr>
+        <p:style>
+          <a:lnRef idx="2">
+            <a:schemeClr val="accent1">
+              <a:shade val="50000"/>
+            </a:schemeClr>
+          </a:lnRef>
+          <a:fillRef idx="1">
+            <a:schemeClr val="accent1"/>
+          </a:fillRef>
+          <a:effectRef idx="0">
+            <a:schemeClr val="accent1"/>
+          </a:effectRef>
+          <a:fontRef idx="minor">
+            <a:schemeClr val="lt1"/>
+          </a:fontRef>
+        </p:style>
+        <p:txBody>
+          <a:bodyPr rtlCol="0" anchor="ctr"/>
+          <a:lstStyle/>
+          <a:p>
+            <a:pPr algn="ctr"/>
+            <a:endParaRPr lang="en-US"/>
+          </a:p>
+        </p:txBody>
+      </p:sp>
+      <p:cxnSp>
+        <p:nvCxnSpPr>
+          <p:cNvPr id="22" name="Straight Arrow Connector 21"/>
+          <p:cNvCxnSpPr/>
+          <p:nvPr/>
+        </p:nvCxnSpPr>
+        <p:spPr>
+          <a:xfrm flipH="1">
+            <a:off x="2467710" y="2509701"/>
+            <a:ext cx="641316" cy="506484"/>
+          </a:xfrm>
+          <a:prstGeom prst="straightConnector1">
+            <a:avLst/>
+          </a:prstGeom>
+          <a:ln>
+            <a:tailEnd type="triangle"/>
+          </a:ln>
+        </p:spPr>
+        <p:style>
+          <a:lnRef idx="1">
+            <a:schemeClr val="accent1"/>
+          </a:lnRef>
+          <a:fillRef idx="0">
+            <a:schemeClr val="accent1"/>
+          </a:fillRef>
+          <a:effectRef idx="0">
+            <a:schemeClr val="accent1"/>
+          </a:effectRef>
+          <a:fontRef idx="minor">
+            <a:schemeClr val="tx1"/>
+          </a:fontRef>
+        </p:style>
+      </p:cxnSp>
+      <p:cxnSp>
+        <p:nvCxnSpPr>
+          <p:cNvPr id="25" name="Straight Arrow Connector 24"/>
+          <p:cNvCxnSpPr/>
+          <p:nvPr/>
+        </p:nvCxnSpPr>
+        <p:spPr>
+          <a:xfrm flipH="1">
+            <a:off x="1735019" y="3314271"/>
+            <a:ext cx="392722" cy="343329"/>
+          </a:xfrm>
+          <a:prstGeom prst="straightConnector1">
+            <a:avLst/>
+          </a:prstGeom>
+          <a:ln>
+            <a:tailEnd type="triangle"/>
+          </a:ln>
+        </p:spPr>
+        <p:style>
+          <a:lnRef idx="1">
+            <a:schemeClr val="accent1"/>
+          </a:lnRef>
+          <a:fillRef idx="0">
+            <a:schemeClr val="accent1"/>
+          </a:fillRef>
+          <a:effectRef idx="0">
+            <a:schemeClr val="accent1"/>
+          </a:effectRef>
+          <a:fontRef idx="minor">
+            <a:schemeClr val="tx1"/>
+          </a:fontRef>
+        </p:style>
+      </p:cxnSp>
+      <p:cxnSp>
+        <p:nvCxnSpPr>
+          <p:cNvPr id="27" name="Straight Arrow Connector 26"/>
+          <p:cNvCxnSpPr/>
+          <p:nvPr/>
+        </p:nvCxnSpPr>
+        <p:spPr>
+          <a:xfrm>
+            <a:off x="7268308" y="-1125415"/>
+            <a:ext cx="0" cy="0"/>
+          </a:xfrm>
+          <a:prstGeom prst="straightConnector1">
+            <a:avLst/>
+          </a:prstGeom>
+          <a:ln>
+            <a:tailEnd type="triangle"/>
+          </a:ln>
+        </p:spPr>
+        <p:style>
+          <a:lnRef idx="1">
+            <a:schemeClr val="accent1"/>
+          </a:lnRef>
+          <a:fillRef idx="0">
+            <a:schemeClr val="accent1"/>
+          </a:fillRef>
+          <a:effectRef idx="0">
+            <a:schemeClr val="accent1"/>
+          </a:effectRef>
+          <a:fontRef idx="minor">
+            <a:schemeClr val="tx1"/>
+          </a:fontRef>
+        </p:style>
+      </p:cxnSp>
+      <p:cxnSp>
+        <p:nvCxnSpPr>
+          <p:cNvPr id="29" name="Straight Arrow Connector 28"/>
+          <p:cNvCxnSpPr/>
+          <p:nvPr/>
+        </p:nvCxnSpPr>
+        <p:spPr>
+          <a:xfrm>
+            <a:off x="3540360" y="2509701"/>
+            <a:ext cx="744417" cy="506484"/>
+          </a:xfrm>
+          <a:prstGeom prst="straightConnector1">
+            <a:avLst/>
+          </a:prstGeom>
+          <a:ln>
+            <a:tailEnd type="triangle"/>
+          </a:ln>
+        </p:spPr>
+        <p:style>
+          <a:lnRef idx="1">
+            <a:schemeClr val="accent1"/>
+          </a:lnRef>
+          <a:fillRef idx="0">
+            <a:schemeClr val="accent1"/>
+          </a:fillRef>
+          <a:effectRef idx="0">
+            <a:schemeClr val="accent1"/>
+          </a:effectRef>
+          <a:fontRef idx="minor">
+            <a:schemeClr val="tx1"/>
+          </a:fontRef>
+        </p:style>
+      </p:cxnSp>
+      <p:cxnSp>
+        <p:nvCxnSpPr>
+          <p:cNvPr id="30" name="Straight Arrow Connector 29"/>
+          <p:cNvCxnSpPr/>
+          <p:nvPr/>
+        </p:nvCxnSpPr>
+        <p:spPr>
+          <a:xfrm>
+            <a:off x="4970573" y="3295144"/>
+            <a:ext cx="744417" cy="506484"/>
+          </a:xfrm>
+          <a:prstGeom prst="straightConnector1">
+            <a:avLst/>
+          </a:prstGeom>
+          <a:ln>
+            <a:tailEnd type="triangle"/>
+          </a:ln>
+        </p:spPr>
+        <p:style>
+          <a:lnRef idx="1">
+            <a:schemeClr val="accent1"/>
+          </a:lnRef>
+          <a:fillRef idx="0">
+            <a:schemeClr val="accent1"/>
+          </a:fillRef>
+          <a:effectRef idx="0">
+            <a:schemeClr val="accent1"/>
+          </a:effectRef>
+          <a:fontRef idx="minor">
+            <a:schemeClr val="tx1"/>
+          </a:fontRef>
+        </p:style>
+      </p:cxnSp>
+      <p:cxnSp>
+        <p:nvCxnSpPr>
+          <p:cNvPr id="31" name="Straight Arrow Connector 30"/>
+          <p:cNvCxnSpPr/>
+          <p:nvPr/>
+        </p:nvCxnSpPr>
+        <p:spPr>
+          <a:xfrm>
+            <a:off x="6201494" y="4092309"/>
+            <a:ext cx="744417" cy="506484"/>
+          </a:xfrm>
+          <a:prstGeom prst="straightConnector1">
+            <a:avLst/>
+          </a:prstGeom>
+          <a:ln>
+            <a:tailEnd type="triangle"/>
+          </a:ln>
+        </p:spPr>
+        <p:style>
+          <a:lnRef idx="1">
+            <a:schemeClr val="accent1"/>
+          </a:lnRef>
+          <a:fillRef idx="0">
+            <a:schemeClr val="accent1"/>
+          </a:fillRef>
+          <a:effectRef idx="0">
+            <a:schemeClr val="accent1"/>
+          </a:effectRef>
+          <a:fontRef idx="minor">
+            <a:schemeClr val="tx1"/>
+          </a:fontRef>
+        </p:style>
+      </p:cxnSp>
+      <p:cxnSp>
+        <p:nvCxnSpPr>
+          <p:cNvPr id="32" name="Straight Arrow Connector 31"/>
+          <p:cNvCxnSpPr/>
+          <p:nvPr/>
+        </p:nvCxnSpPr>
+        <p:spPr>
+          <a:xfrm>
+            <a:off x="7268296" y="4948092"/>
+            <a:ext cx="744417" cy="506484"/>
+          </a:xfrm>
+          <a:prstGeom prst="straightConnector1">
+            <a:avLst/>
+          </a:prstGeom>
+          <a:ln>
+            <a:tailEnd type="triangle"/>
+          </a:ln>
+        </p:spPr>
+        <p:style>
+          <a:lnRef idx="1">
+            <a:schemeClr val="accent1"/>
+          </a:lnRef>
+          <a:fillRef idx="0">
+            <a:schemeClr val="accent1"/>
+          </a:fillRef>
+          <a:effectRef idx="0">
+            <a:schemeClr val="accent1"/>
+          </a:effectRef>
+          <a:fontRef idx="minor">
+            <a:schemeClr val="tx1"/>
+          </a:fontRef>
+        </p:style>
+      </p:cxnSp>
+      <p:cxnSp>
+        <p:nvCxnSpPr>
+          <p:cNvPr id="34" name="Straight Arrow Connector 33"/>
+          <p:cNvCxnSpPr/>
+          <p:nvPr/>
+        </p:nvCxnSpPr>
+        <p:spPr>
+          <a:xfrm>
+            <a:off x="2414949" y="3353759"/>
+            <a:ext cx="445473" cy="447869"/>
+          </a:xfrm>
+          <a:prstGeom prst="straightConnector1">
+            <a:avLst/>
+          </a:prstGeom>
+          <a:ln>
+            <a:tailEnd type="triangle"/>
+          </a:ln>
+        </p:spPr>
+        <p:style>
+          <a:lnRef idx="1">
+            <a:schemeClr val="accent1"/>
+          </a:lnRef>
+          <a:fillRef idx="0">
+            <a:schemeClr val="accent1"/>
+          </a:fillRef>
+          <a:effectRef idx="0">
+            <a:schemeClr val="accent1"/>
+          </a:effectRef>
+          <a:fontRef idx="minor">
+            <a:schemeClr val="tx1"/>
+          </a:fontRef>
+        </p:style>
+      </p:cxnSp>
+      <p:cxnSp>
+        <p:nvCxnSpPr>
+          <p:cNvPr id="39" name="Straight Arrow Connector 38"/>
+          <p:cNvCxnSpPr/>
+          <p:nvPr/>
+        </p:nvCxnSpPr>
+        <p:spPr>
+          <a:xfrm>
+            <a:off x="3165223" y="4244710"/>
+            <a:ext cx="445473" cy="447869"/>
+          </a:xfrm>
+          <a:prstGeom prst="straightConnector1">
+            <a:avLst/>
+          </a:prstGeom>
+          <a:ln>
+            <a:tailEnd type="triangle"/>
+          </a:ln>
+        </p:spPr>
+        <p:style>
+          <a:lnRef idx="1">
+            <a:schemeClr val="accent1"/>
+          </a:lnRef>
+          <a:fillRef idx="0">
+            <a:schemeClr val="accent1"/>
+          </a:fillRef>
+          <a:effectRef idx="0">
+            <a:schemeClr val="accent1"/>
+          </a:effectRef>
+          <a:fontRef idx="minor">
+            <a:schemeClr val="tx1"/>
+          </a:fontRef>
+        </p:style>
+      </p:cxnSp>
+      <p:cxnSp>
+        <p:nvCxnSpPr>
+          <p:cNvPr id="40" name="Straight Arrow Connector 39"/>
+          <p:cNvCxnSpPr/>
+          <p:nvPr/>
+        </p:nvCxnSpPr>
+        <p:spPr>
+          <a:xfrm>
+            <a:off x="3845163" y="5135666"/>
+            <a:ext cx="445473" cy="447869"/>
+          </a:xfrm>
+          <a:prstGeom prst="straightConnector1">
+            <a:avLst/>
+          </a:prstGeom>
+          <a:ln>
+            <a:tailEnd type="triangle"/>
+          </a:ln>
+        </p:spPr>
+        <p:style>
+          <a:lnRef idx="1">
+            <a:schemeClr val="accent1"/>
+          </a:lnRef>
+          <a:fillRef idx="0">
+            <a:schemeClr val="accent1"/>
+          </a:fillRef>
+          <a:effectRef idx="0">
+            <a:schemeClr val="accent1"/>
+          </a:effectRef>
+          <a:fontRef idx="minor">
+            <a:schemeClr val="tx1"/>
+          </a:fontRef>
+        </p:style>
+      </p:cxnSp>
+      <p:cxnSp>
+        <p:nvCxnSpPr>
+          <p:cNvPr id="42" name="Straight Arrow Connector 41"/>
+          <p:cNvCxnSpPr/>
+          <p:nvPr/>
+        </p:nvCxnSpPr>
+        <p:spPr>
+          <a:xfrm flipH="1">
+            <a:off x="4237892" y="3373873"/>
+            <a:ext cx="275490" cy="332905"/>
+          </a:xfrm>
+          <a:prstGeom prst="straightConnector1">
+            <a:avLst/>
+          </a:prstGeom>
+          <a:ln>
+            <a:tailEnd type="triangle"/>
+          </a:ln>
+        </p:spPr>
+        <p:style>
+          <a:lnRef idx="1">
+            <a:schemeClr val="accent1"/>
+          </a:lnRef>
+          <a:fillRef idx="0">
+            <a:schemeClr val="accent1"/>
+          </a:fillRef>
+          <a:effectRef idx="0">
+            <a:schemeClr val="accent1"/>
+          </a:effectRef>
+          <a:fontRef idx="minor">
+            <a:schemeClr val="tx1"/>
+          </a:fontRef>
+        </p:style>
+      </p:cxnSp>
+      <p:cxnSp>
+        <p:nvCxnSpPr>
+          <p:cNvPr id="46" name="Straight Arrow Connector 45"/>
+          <p:cNvCxnSpPr/>
+          <p:nvPr/>
+        </p:nvCxnSpPr>
+        <p:spPr>
+          <a:xfrm flipH="1">
+            <a:off x="5621214" y="4124147"/>
+            <a:ext cx="275490" cy="332905"/>
+          </a:xfrm>
+          <a:prstGeom prst="straightConnector1">
+            <a:avLst/>
+          </a:prstGeom>
+          <a:ln>
+            <a:tailEnd type="triangle"/>
+          </a:ln>
+        </p:spPr>
+        <p:style>
+          <a:lnRef idx="1">
+            <a:schemeClr val="accent1"/>
+          </a:lnRef>
+          <a:fillRef idx="0">
+            <a:schemeClr val="accent1"/>
+          </a:fillRef>
+          <a:effectRef idx="0">
+            <a:schemeClr val="accent1"/>
+          </a:effectRef>
+          <a:fontRef idx="minor">
+            <a:schemeClr val="tx1"/>
+          </a:fontRef>
+        </p:style>
+      </p:cxnSp>
+      <p:cxnSp>
+        <p:nvCxnSpPr>
+          <p:cNvPr id="47" name="Straight Arrow Connector 46"/>
+          <p:cNvCxnSpPr/>
+          <p:nvPr/>
+        </p:nvCxnSpPr>
+        <p:spPr>
+          <a:xfrm flipH="1">
+            <a:off x="6676286" y="4968206"/>
+            <a:ext cx="275490" cy="332905"/>
+          </a:xfrm>
+          <a:prstGeom prst="straightConnector1">
+            <a:avLst/>
+          </a:prstGeom>
+          <a:ln>
+            <a:tailEnd type="triangle"/>
+          </a:ln>
+        </p:spPr>
+        <p:style>
+          <a:lnRef idx="1">
+            <a:schemeClr val="accent1"/>
+          </a:lnRef>
+          <a:fillRef idx="0">
+            <a:schemeClr val="accent1"/>
+          </a:fillRef>
+          <a:effectRef idx="0">
+            <a:schemeClr val="accent1"/>
+          </a:effectRef>
+          <a:fontRef idx="minor">
+            <a:schemeClr val="tx1"/>
+          </a:fontRef>
+        </p:style>
+      </p:cxnSp>
+      <p:cxnSp>
+        <p:nvCxnSpPr>
+          <p:cNvPr id="48" name="Straight Arrow Connector 47"/>
+          <p:cNvCxnSpPr/>
+          <p:nvPr/>
+        </p:nvCxnSpPr>
+        <p:spPr>
+          <a:xfrm flipH="1">
+            <a:off x="2608389" y="4264823"/>
+            <a:ext cx="275490" cy="332905"/>
+          </a:xfrm>
+          <a:prstGeom prst="straightConnector1">
+            <a:avLst/>
+          </a:prstGeom>
+          <a:ln>
+            <a:tailEnd type="triangle"/>
+          </a:ln>
+        </p:spPr>
+        <p:style>
+          <a:lnRef idx="1">
+            <a:schemeClr val="accent1"/>
+          </a:lnRef>
+          <a:fillRef idx="0">
+            <a:schemeClr val="accent1"/>
+          </a:fillRef>
+          <a:effectRef idx="0">
+            <a:schemeClr val="accent1"/>
+          </a:effectRef>
+          <a:fontRef idx="minor">
+            <a:schemeClr val="tx1"/>
+          </a:fontRef>
+        </p:style>
+      </p:cxnSp>
+      <p:cxnSp>
+        <p:nvCxnSpPr>
+          <p:cNvPr id="49" name="Straight Arrow Connector 48"/>
+          <p:cNvCxnSpPr/>
+          <p:nvPr/>
+        </p:nvCxnSpPr>
+        <p:spPr>
+          <a:xfrm flipH="1">
+            <a:off x="3206264" y="5120610"/>
+            <a:ext cx="275490" cy="332905"/>
+          </a:xfrm>
+          <a:prstGeom prst="straightConnector1">
+            <a:avLst/>
+          </a:prstGeom>
+          <a:ln>
+            <a:tailEnd type="triangle"/>
+          </a:ln>
+        </p:spPr>
+        <p:style>
+          <a:lnRef idx="1">
+            <a:schemeClr val="accent1"/>
+          </a:lnRef>
+          <a:fillRef idx="0">
+            <a:schemeClr val="accent1"/>
+          </a:fillRef>
+          <a:effectRef idx="0">
+            <a:schemeClr val="accent1"/>
+          </a:effectRef>
+          <a:fontRef idx="minor">
+            <a:schemeClr val="tx1"/>
+          </a:fontRef>
+        </p:style>
+      </p:cxnSp>
+      <p:sp>
+        <p:nvSpPr>
+          <p:cNvPr id="50" name="TextBox 49"/>
           <p:cNvSpPr txBox="1"/>
           <p:nvPr/>
         </p:nvSpPr>
         <p:spPr>
           <a:xfrm>
-            <a:off x="7104185" y="2600482"/>
-            <a:ext cx="3763107" cy="523220"/>
+            <a:off x="2520453" y="2410939"/>
+            <a:ext cx="339969" cy="369332"/>
           </a:xfrm>
           <a:prstGeom prst="rect">
             <a:avLst/>
@@ -8215,18 +7610,628 @@
           </a:bodyPr>
           <a:lstStyle/>
           <a:p>
-            <a:pPr algn="r"/>
-            <a:r>
-              <a:rPr lang="fa-IR" sz="2800" dirty="0"/>
-              <a:t>ساخت، رنگ و پیمایش: </a:t>
-            </a:r>
-            <a:endParaRPr lang="en-US" sz="2800" dirty="0"/>
+            <a:r>
+              <a:rPr lang="en-US" dirty="0"/>
+              <a:t>A</a:t>
+            </a:r>
+          </a:p>
+        </p:txBody>
+      </p:sp>
+      <p:sp>
+        <p:nvSpPr>
+          <p:cNvPr id="51" name="TextBox 50"/>
+          <p:cNvSpPr txBox="1"/>
+          <p:nvPr/>
+        </p:nvSpPr>
+        <p:spPr>
+          <a:xfrm>
+            <a:off x="3781907" y="2341837"/>
+            <a:ext cx="785434" cy="369332"/>
+          </a:xfrm>
+          <a:prstGeom prst="rect">
+            <a:avLst/>
+          </a:prstGeom>
+          <a:noFill/>
+        </p:spPr>
+        <p:txBody>
+          <a:bodyPr wrap="square" rtlCol="0">
+            <a:spAutoFit/>
+          </a:bodyPr>
+          <a:lstStyle/>
+          <a:p>
+            <a:r>
+              <a:rPr lang="en-US" dirty="0"/>
+              <a:t>B</a:t>
+            </a:r>
+          </a:p>
+        </p:txBody>
+      </p:sp>
+      <p:sp>
+        <p:nvSpPr>
+          <p:cNvPr id="52" name="TextBox 51"/>
+          <p:cNvSpPr txBox="1"/>
+          <p:nvPr/>
+        </p:nvSpPr>
+        <p:spPr>
+          <a:xfrm>
+            <a:off x="5233118" y="3208361"/>
+            <a:ext cx="339969" cy="369332"/>
+          </a:xfrm>
+          <a:prstGeom prst="rect">
+            <a:avLst/>
+          </a:prstGeom>
+          <a:noFill/>
+        </p:spPr>
+        <p:txBody>
+          <a:bodyPr wrap="square" rtlCol="0">
+            <a:spAutoFit/>
+          </a:bodyPr>
+          <a:lstStyle/>
+          <a:p>
+            <a:r>
+              <a:rPr lang="en-US" dirty="0"/>
+              <a:t>A</a:t>
+            </a:r>
+          </a:p>
+        </p:txBody>
+      </p:sp>
+      <p:sp>
+        <p:nvSpPr>
+          <p:cNvPr id="53" name="TextBox 52"/>
+          <p:cNvSpPr txBox="1"/>
+          <p:nvPr/>
+        </p:nvSpPr>
+        <p:spPr>
+          <a:xfrm>
+            <a:off x="3311769" y="4145669"/>
+            <a:ext cx="339969" cy="369332"/>
+          </a:xfrm>
+          <a:prstGeom prst="rect">
+            <a:avLst/>
+          </a:prstGeom>
+          <a:noFill/>
+        </p:spPr>
+        <p:txBody>
+          <a:bodyPr wrap="square" rtlCol="0">
+            <a:spAutoFit/>
+          </a:bodyPr>
+          <a:lstStyle/>
+          <a:p>
+            <a:r>
+              <a:rPr lang="en-US" dirty="0"/>
+              <a:t>A</a:t>
+            </a:r>
+          </a:p>
+        </p:txBody>
+      </p:sp>
+      <p:sp>
+        <p:nvSpPr>
+          <p:cNvPr id="54" name="TextBox 53"/>
+          <p:cNvSpPr txBox="1"/>
+          <p:nvPr/>
+        </p:nvSpPr>
+        <p:spPr>
+          <a:xfrm>
+            <a:off x="2520453" y="3231466"/>
+            <a:ext cx="785434" cy="369332"/>
+          </a:xfrm>
+          <a:prstGeom prst="rect">
+            <a:avLst/>
+          </a:prstGeom>
+          <a:noFill/>
+        </p:spPr>
+        <p:txBody>
+          <a:bodyPr wrap="square" rtlCol="0">
+            <a:spAutoFit/>
+          </a:bodyPr>
+          <a:lstStyle/>
+          <a:p>
+            <a:r>
+              <a:rPr lang="en-US" dirty="0"/>
+              <a:t>B</a:t>
+            </a:r>
+          </a:p>
+        </p:txBody>
+      </p:sp>
+      <p:sp>
+        <p:nvSpPr>
+          <p:cNvPr id="55" name="TextBox 54"/>
+          <p:cNvSpPr txBox="1"/>
+          <p:nvPr/>
+        </p:nvSpPr>
+        <p:spPr>
+          <a:xfrm>
+            <a:off x="6476981" y="4000851"/>
+            <a:ext cx="785434" cy="369332"/>
+          </a:xfrm>
+          <a:prstGeom prst="rect">
+            <a:avLst/>
+          </a:prstGeom>
+          <a:noFill/>
+        </p:spPr>
+        <p:txBody>
+          <a:bodyPr wrap="square" rtlCol="0">
+            <a:spAutoFit/>
+          </a:bodyPr>
+          <a:lstStyle/>
+          <a:p>
+            <a:r>
+              <a:rPr lang="en-US" dirty="0"/>
+              <a:t>B</a:t>
+            </a:r>
+          </a:p>
+        </p:txBody>
+      </p:sp>
+      <p:sp>
+        <p:nvSpPr>
+          <p:cNvPr id="56" name="TextBox 55"/>
+          <p:cNvSpPr txBox="1"/>
+          <p:nvPr/>
+        </p:nvSpPr>
+        <p:spPr>
+          <a:xfrm>
+            <a:off x="1164191" y="3747447"/>
+            <a:ext cx="896819" cy="369332"/>
+          </a:xfrm>
+          <a:prstGeom prst="rect">
+            <a:avLst/>
+          </a:prstGeom>
+          <a:noFill/>
+        </p:spPr>
+        <p:txBody>
+          <a:bodyPr wrap="square" rtlCol="0">
+            <a:spAutoFit/>
+          </a:bodyPr>
+          <a:lstStyle/>
+          <a:p>
+            <a:r>
+              <a:rPr lang="en-US" dirty="0">
+                <a:solidFill>
+                  <a:schemeClr val="bg1"/>
+                </a:solidFill>
+              </a:rPr>
+              <a:t>1:3</a:t>
+            </a:r>
+          </a:p>
+        </p:txBody>
+      </p:sp>
+      <p:sp>
+        <p:nvSpPr>
+          <p:cNvPr id="57" name="TextBox 56"/>
+          <p:cNvSpPr txBox="1"/>
+          <p:nvPr/>
+        </p:nvSpPr>
+        <p:spPr>
+          <a:xfrm>
+            <a:off x="3789482" y="3770725"/>
+            <a:ext cx="896819" cy="369332"/>
+          </a:xfrm>
+          <a:prstGeom prst="rect">
+            <a:avLst/>
+          </a:prstGeom>
+          <a:noFill/>
+        </p:spPr>
+        <p:txBody>
+          <a:bodyPr wrap="square" rtlCol="0">
+            <a:spAutoFit/>
+          </a:bodyPr>
+          <a:lstStyle/>
+          <a:p>
+            <a:r>
+              <a:rPr lang="en-US" dirty="0">
+                <a:solidFill>
+                  <a:schemeClr val="bg1"/>
+                </a:solidFill>
+              </a:rPr>
+              <a:t>0:3</a:t>
+            </a:r>
+          </a:p>
+        </p:txBody>
+      </p:sp>
+      <p:sp>
+        <p:nvSpPr>
+          <p:cNvPr id="58" name="TextBox 57"/>
+          <p:cNvSpPr txBox="1"/>
+          <p:nvPr/>
+        </p:nvSpPr>
+        <p:spPr>
+          <a:xfrm>
+            <a:off x="2212207" y="4743791"/>
+            <a:ext cx="896819" cy="369332"/>
+          </a:xfrm>
+          <a:prstGeom prst="rect">
+            <a:avLst/>
+          </a:prstGeom>
+          <a:noFill/>
+        </p:spPr>
+        <p:txBody>
+          <a:bodyPr wrap="square" rtlCol="0">
+            <a:spAutoFit/>
+          </a:bodyPr>
+          <a:lstStyle/>
+          <a:p>
+            <a:r>
+              <a:rPr lang="en-US" dirty="0">
+                <a:solidFill>
+                  <a:schemeClr val="bg1"/>
+                </a:solidFill>
+              </a:rPr>
+              <a:t>0:2</a:t>
+            </a:r>
+          </a:p>
+        </p:txBody>
+      </p:sp>
+      <p:sp>
+        <p:nvSpPr>
+          <p:cNvPr id="59" name="TextBox 58"/>
+          <p:cNvSpPr txBox="1"/>
+          <p:nvPr/>
+        </p:nvSpPr>
+        <p:spPr>
+          <a:xfrm>
+            <a:off x="2796467" y="5575189"/>
+            <a:ext cx="896819" cy="369332"/>
+          </a:xfrm>
+          <a:prstGeom prst="rect">
+            <a:avLst/>
+          </a:prstGeom>
+          <a:noFill/>
+        </p:spPr>
+        <p:txBody>
+          <a:bodyPr wrap="square" rtlCol="0">
+            <a:spAutoFit/>
+          </a:bodyPr>
+          <a:lstStyle/>
+          <a:p>
+            <a:r>
+              <a:rPr lang="en-US" dirty="0">
+                <a:solidFill>
+                  <a:schemeClr val="bg1"/>
+                </a:solidFill>
+              </a:rPr>
+              <a:t>1:1</a:t>
+            </a:r>
+          </a:p>
+        </p:txBody>
+      </p:sp>
+      <p:sp>
+        <p:nvSpPr>
+          <p:cNvPr id="60" name="TextBox 59"/>
+          <p:cNvSpPr txBox="1"/>
+          <p:nvPr/>
+        </p:nvSpPr>
+        <p:spPr>
+          <a:xfrm>
+            <a:off x="4347098" y="5575189"/>
+            <a:ext cx="896819" cy="369332"/>
+          </a:xfrm>
+          <a:prstGeom prst="rect">
+            <a:avLst/>
+          </a:prstGeom>
+          <a:noFill/>
+        </p:spPr>
+        <p:txBody>
+          <a:bodyPr wrap="square" rtlCol="0">
+            <a:spAutoFit/>
+          </a:bodyPr>
+          <a:lstStyle/>
+          <a:p>
+            <a:r>
+              <a:rPr lang="en-US" dirty="0">
+                <a:solidFill>
+                  <a:schemeClr val="bg1"/>
+                </a:solidFill>
+              </a:rPr>
+              <a:t>0:0</a:t>
+            </a:r>
+          </a:p>
+        </p:txBody>
+      </p:sp>
+      <p:sp>
+        <p:nvSpPr>
+          <p:cNvPr id="61" name="TextBox 60"/>
+          <p:cNvSpPr txBox="1"/>
+          <p:nvPr/>
+        </p:nvSpPr>
+        <p:spPr>
+          <a:xfrm>
+            <a:off x="6246712" y="5469748"/>
+            <a:ext cx="896819" cy="369332"/>
+          </a:xfrm>
+          <a:prstGeom prst="rect">
+            <a:avLst/>
+          </a:prstGeom>
+          <a:noFill/>
+        </p:spPr>
+        <p:txBody>
+          <a:bodyPr wrap="square" rtlCol="0">
+            <a:spAutoFit/>
+          </a:bodyPr>
+          <a:lstStyle/>
+          <a:p>
+            <a:r>
+              <a:rPr lang="en-US" dirty="0">
+                <a:solidFill>
+                  <a:schemeClr val="bg1"/>
+                </a:solidFill>
+              </a:rPr>
+              <a:t>0:1</a:t>
+            </a:r>
+          </a:p>
+        </p:txBody>
+      </p:sp>
+      <p:sp>
+        <p:nvSpPr>
+          <p:cNvPr id="62" name="TextBox 61"/>
+          <p:cNvSpPr txBox="1"/>
+          <p:nvPr/>
+        </p:nvSpPr>
+        <p:spPr>
+          <a:xfrm>
+            <a:off x="8012713" y="5470537"/>
+            <a:ext cx="896819" cy="369332"/>
+          </a:xfrm>
+          <a:prstGeom prst="rect">
+            <a:avLst/>
+          </a:prstGeom>
+          <a:noFill/>
+        </p:spPr>
+        <p:txBody>
+          <a:bodyPr wrap="square" rtlCol="0">
+            <a:spAutoFit/>
+          </a:bodyPr>
+          <a:lstStyle/>
+          <a:p>
+            <a:r>
+              <a:rPr lang="en-US" dirty="0">
+                <a:solidFill>
+                  <a:schemeClr val="bg1"/>
+                </a:solidFill>
+              </a:rPr>
+              <a:t>1:0</a:t>
+            </a:r>
+          </a:p>
+        </p:txBody>
+      </p:sp>
+      <p:sp>
+        <p:nvSpPr>
+          <p:cNvPr id="63" name="TextBox 62"/>
+          <p:cNvSpPr txBox="1"/>
+          <p:nvPr/>
+        </p:nvSpPr>
+        <p:spPr>
+          <a:xfrm>
+            <a:off x="5172779" y="4545979"/>
+            <a:ext cx="896819" cy="369332"/>
+          </a:xfrm>
+          <a:prstGeom prst="rect">
+            <a:avLst/>
+          </a:prstGeom>
+          <a:noFill/>
+        </p:spPr>
+        <p:txBody>
+          <a:bodyPr wrap="square" rtlCol="0">
+            <a:spAutoFit/>
+          </a:bodyPr>
+          <a:lstStyle/>
+          <a:p>
+            <a:r>
+              <a:rPr lang="en-US" dirty="0">
+                <a:solidFill>
+                  <a:schemeClr val="bg1"/>
+                </a:solidFill>
+              </a:rPr>
+              <a:t>1:2</a:t>
+            </a:r>
+          </a:p>
+        </p:txBody>
+      </p:sp>
+      <p:sp>
+        <p:nvSpPr>
+          <p:cNvPr id="64" name="TextBox 63"/>
+          <p:cNvSpPr txBox="1"/>
+          <p:nvPr/>
+        </p:nvSpPr>
+        <p:spPr>
+          <a:xfrm>
+            <a:off x="1652434" y="3177575"/>
+            <a:ext cx="1473494" cy="369332"/>
+          </a:xfrm>
+          <a:prstGeom prst="rect">
+            <a:avLst/>
+          </a:prstGeom>
+          <a:noFill/>
+        </p:spPr>
+        <p:txBody>
+          <a:bodyPr wrap="square" rtlCol="0">
+            <a:spAutoFit/>
+          </a:bodyPr>
+          <a:lstStyle/>
+          <a:p>
+            <a:r>
+              <a:rPr lang="en-US" dirty="0"/>
+              <a:t>$1</a:t>
+            </a:r>
+          </a:p>
+        </p:txBody>
+      </p:sp>
+      <p:sp>
+        <p:nvSpPr>
+          <p:cNvPr id="66" name="TextBox 65"/>
+          <p:cNvSpPr txBox="1"/>
+          <p:nvPr/>
+        </p:nvSpPr>
+        <p:spPr>
+          <a:xfrm>
+            <a:off x="4053867" y="3257346"/>
+            <a:ext cx="1473494" cy="369332"/>
+          </a:xfrm>
+          <a:prstGeom prst="rect">
+            <a:avLst/>
+          </a:prstGeom>
+          <a:noFill/>
+        </p:spPr>
+        <p:txBody>
+          <a:bodyPr wrap="square" rtlCol="0">
+            <a:spAutoFit/>
+          </a:bodyPr>
+          <a:lstStyle/>
+          <a:p>
+            <a:r>
+              <a:rPr lang="en-US" dirty="0"/>
+              <a:t>$0</a:t>
+            </a:r>
+          </a:p>
+        </p:txBody>
+      </p:sp>
+      <p:sp>
+        <p:nvSpPr>
+          <p:cNvPr id="67" name="TextBox 66"/>
+          <p:cNvSpPr txBox="1"/>
+          <p:nvPr/>
+        </p:nvSpPr>
+        <p:spPr>
+          <a:xfrm>
+            <a:off x="5464747" y="4000297"/>
+            <a:ext cx="1473494" cy="369332"/>
+          </a:xfrm>
+          <a:prstGeom prst="rect">
+            <a:avLst/>
+          </a:prstGeom>
+          <a:noFill/>
+        </p:spPr>
+        <p:txBody>
+          <a:bodyPr wrap="square" rtlCol="0">
+            <a:spAutoFit/>
+          </a:bodyPr>
+          <a:lstStyle/>
+          <a:p>
+            <a:r>
+              <a:rPr lang="en-US" dirty="0"/>
+              <a:t>$1</a:t>
+            </a:r>
+          </a:p>
+        </p:txBody>
+      </p:sp>
+      <p:sp>
+        <p:nvSpPr>
+          <p:cNvPr id="68" name="TextBox 67"/>
+          <p:cNvSpPr txBox="1"/>
+          <p:nvPr/>
+        </p:nvSpPr>
+        <p:spPr>
+          <a:xfrm>
+            <a:off x="3093847" y="4982782"/>
+            <a:ext cx="1473494" cy="369332"/>
+          </a:xfrm>
+          <a:prstGeom prst="rect">
+            <a:avLst/>
+          </a:prstGeom>
+          <a:noFill/>
+        </p:spPr>
+        <p:txBody>
+          <a:bodyPr wrap="square" rtlCol="0">
+            <a:spAutoFit/>
+          </a:bodyPr>
+          <a:lstStyle/>
+          <a:p>
+            <a:r>
+              <a:rPr lang="en-US" dirty="0"/>
+              <a:t>$1</a:t>
+            </a:r>
+          </a:p>
+        </p:txBody>
+      </p:sp>
+      <p:sp>
+        <p:nvSpPr>
+          <p:cNvPr id="69" name="TextBox 68"/>
+          <p:cNvSpPr txBox="1"/>
+          <p:nvPr/>
+        </p:nvSpPr>
+        <p:spPr>
+          <a:xfrm>
+            <a:off x="7510387" y="4889052"/>
+            <a:ext cx="1473494" cy="369332"/>
+          </a:xfrm>
+          <a:prstGeom prst="rect">
+            <a:avLst/>
+          </a:prstGeom>
+          <a:noFill/>
+        </p:spPr>
+        <p:txBody>
+          <a:bodyPr wrap="square" rtlCol="0">
+            <a:spAutoFit/>
+          </a:bodyPr>
+          <a:lstStyle/>
+          <a:p>
+            <a:r>
+              <a:rPr lang="en-US" dirty="0"/>
+              <a:t>$1</a:t>
+            </a:r>
+          </a:p>
+        </p:txBody>
+      </p:sp>
+      <p:sp>
+        <p:nvSpPr>
+          <p:cNvPr id="70" name="TextBox 69"/>
+          <p:cNvSpPr txBox="1"/>
+          <p:nvPr/>
+        </p:nvSpPr>
+        <p:spPr>
+          <a:xfrm>
+            <a:off x="2458373" y="4148282"/>
+            <a:ext cx="1473494" cy="369332"/>
+          </a:xfrm>
+          <a:prstGeom prst="rect">
+            <a:avLst/>
+          </a:prstGeom>
+          <a:noFill/>
+        </p:spPr>
+        <p:txBody>
+          <a:bodyPr wrap="square" rtlCol="0">
+            <a:spAutoFit/>
+          </a:bodyPr>
+          <a:lstStyle/>
+          <a:p>
+            <a:r>
+              <a:rPr lang="en-US" dirty="0"/>
+              <a:t>$0</a:t>
+            </a:r>
+          </a:p>
+        </p:txBody>
+      </p:sp>
+      <p:sp>
+        <p:nvSpPr>
+          <p:cNvPr id="71" name="TextBox 70"/>
+          <p:cNvSpPr txBox="1"/>
+          <p:nvPr/>
+        </p:nvSpPr>
+        <p:spPr>
+          <a:xfrm>
+            <a:off x="6503422" y="4873091"/>
+            <a:ext cx="1473494" cy="369332"/>
+          </a:xfrm>
+          <a:prstGeom prst="rect">
+            <a:avLst/>
+          </a:prstGeom>
+          <a:noFill/>
+        </p:spPr>
+        <p:txBody>
+          <a:bodyPr wrap="square" rtlCol="0">
+            <a:spAutoFit/>
+          </a:bodyPr>
+          <a:lstStyle/>
+          <a:p>
+            <a:r>
+              <a:rPr lang="en-US" dirty="0"/>
+              <a:t>$0</a:t>
+            </a:r>
           </a:p>
         </p:txBody>
       </p:sp>
       <p:pic>
         <p:nvPicPr>
-          <p:cNvPr id="4" name="Picture 3"/>
+          <p:cNvPr id="72" name="Picture 71"/>
           <p:cNvPicPr>
             <a:picLocks noChangeAspect="1"/>
           </p:cNvPicPr>
@@ -8240,8 +8245,62 @@
         </p:blipFill>
         <p:spPr>
           <a:xfrm>
-            <a:off x="5679492" y="2651623"/>
-            <a:ext cx="2153169" cy="502930"/>
+            <a:off x="7096414" y="3164649"/>
+            <a:ext cx="1889984" cy="413043"/>
+          </a:xfrm>
+          <a:prstGeom prst="rect">
+            <a:avLst/>
+          </a:prstGeom>
+        </p:spPr>
+      </p:pic>
+      <p:sp>
+        <p:nvSpPr>
+          <p:cNvPr id="73" name="TextBox 72"/>
+          <p:cNvSpPr txBox="1"/>
+          <p:nvPr/>
+        </p:nvSpPr>
+        <p:spPr>
+          <a:xfrm>
+            <a:off x="9214338" y="3208361"/>
+            <a:ext cx="2015123" cy="369332"/>
+          </a:xfrm>
+          <a:prstGeom prst="rect">
+            <a:avLst/>
+          </a:prstGeom>
+          <a:noFill/>
+        </p:spPr>
+        <p:txBody>
+          <a:bodyPr wrap="square" rtlCol="0">
+            <a:spAutoFit/>
+          </a:bodyPr>
+          <a:lstStyle/>
+          <a:p>
+            <a:r>
+              <a:rPr lang="fa-IR" dirty="0"/>
+              <a:t>پیدا کردن همه جواب ها:</a:t>
+            </a:r>
+            <a:endParaRPr lang="en-US" dirty="0"/>
+          </a:p>
+        </p:txBody>
+      </p:sp>
+      <p:pic>
+        <p:nvPicPr>
+          <p:cNvPr id="74" name="Picture 73"/>
+          <p:cNvPicPr>
+            <a:picLocks noChangeAspect="1"/>
+          </p:cNvPicPr>
+          <p:nvPr/>
+        </p:nvPicPr>
+        <p:blipFill>
+          <a:blip r:embed="rId3"/>
+          <a:stretch>
+            <a:fillRect/>
+          </a:stretch>
+        </p:blipFill>
+        <p:spPr>
+          <a:xfrm>
+            <a:off x="8446460" y="4116779"/>
+            <a:ext cx="3220029" cy="464148"/>
           </a:xfrm>
           <a:prstGeom prst="rect">
             <a:avLst/>
@@ -8251,7 +8310,7 @@
     </p:spTree>
     <p:extLst>
       <p:ext uri="{BB962C8B-B14F-4D97-AF65-F5344CB8AC3E}">
-        <p14:creationId xmlns:p14="http://schemas.microsoft.com/office/powerpoint/2010/main" val="2760506763"/>
+        <p14:creationId xmlns:p14="http://schemas.microsoft.com/office/powerpoint/2010/main" val="2867097691"/>
       </p:ext>
     </p:extLst>
   </p:cSld>
@@ -8292,6 +8351,146 @@
       </p:grpSpPr>
       <p:sp>
         <p:nvSpPr>
+          <p:cNvPr id="2" name="Title 1"/>
+          <p:cNvSpPr>
+            <a:spLocks noGrp="1"/>
+          </p:cNvSpPr>
+          <p:nvPr>
+            <p:ph type="title"/>
+          </p:nvPr>
+        </p:nvSpPr>
+        <p:spPr>
+          <a:xfrm>
+            <a:off x="1097280" y="227988"/>
+            <a:ext cx="10058400" cy="1450757"/>
+          </a:xfrm>
+        </p:spPr>
+        <p:txBody>
+          <a:bodyPr/>
+          <a:lstStyle/>
+          <a:p>
+            <a:pPr algn="r"/>
+            <a:r>
+              <a:rPr lang="fa-IR" dirty="0">
+                <a:solidFill>
+                  <a:schemeClr val="tx1">
+                    <a:lumMod val="95000"/>
+                    <a:lumOff val="5000"/>
+                  </a:schemeClr>
+                </a:solidFill>
+              </a:rPr>
+              <a:t>طولانی ترین زیر رشته مشترک</a:t>
+            </a:r>
+            <a:endParaRPr lang="en-US" dirty="0">
+              <a:solidFill>
+                <a:schemeClr val="tx1">
+                  <a:lumMod val="95000"/>
+                  <a:lumOff val="5000"/>
+                </a:schemeClr>
+              </a:solidFill>
+            </a:endParaRPr>
+          </a:p>
+        </p:txBody>
+      </p:sp>
+      <p:sp>
+        <p:nvSpPr>
+          <p:cNvPr id="3" name="TextBox 2"/>
+          <p:cNvSpPr txBox="1"/>
+          <p:nvPr/>
+        </p:nvSpPr>
+        <p:spPr>
+          <a:xfrm>
+            <a:off x="7104185" y="2600482"/>
+            <a:ext cx="3763107" cy="523220"/>
+          </a:xfrm>
+          <a:prstGeom prst="rect">
+            <a:avLst/>
+          </a:prstGeom>
+          <a:noFill/>
+        </p:spPr>
+        <p:txBody>
+          <a:bodyPr wrap="square" rtlCol="0">
+            <a:spAutoFit/>
+          </a:bodyPr>
+          <a:lstStyle/>
+          <a:p>
+            <a:pPr algn="r"/>
+            <a:r>
+              <a:rPr lang="fa-IR" sz="2800" dirty="0"/>
+              <a:t>ساخت، رنگ و پیمایش: </a:t>
+            </a:r>
+            <a:endParaRPr lang="en-US" sz="2800" dirty="0"/>
+          </a:p>
+        </p:txBody>
+      </p:sp>
+      <p:pic>
+        <p:nvPicPr>
+          <p:cNvPr id="4" name="Picture 3"/>
+          <p:cNvPicPr>
+            <a:picLocks noChangeAspect="1"/>
+          </p:cNvPicPr>
+          <p:nvPr/>
+        </p:nvPicPr>
+        <p:blipFill>
+          <a:blip r:embed="rId2"/>
+          <a:stretch>
+            <a:fillRect/>
+          </a:stretch>
+        </p:blipFill>
+        <p:spPr>
+          <a:xfrm>
+            <a:off x="5679492" y="2651623"/>
+            <a:ext cx="2153169" cy="502930"/>
+          </a:xfrm>
+          <a:prstGeom prst="rect">
+            <a:avLst/>
+          </a:prstGeom>
+        </p:spPr>
+      </p:pic>
+    </p:spTree>
+    <p:extLst>
+      <p:ext uri="{BB962C8B-B14F-4D97-AF65-F5344CB8AC3E}">
+        <p14:creationId xmlns:p14="http://schemas.microsoft.com/office/powerpoint/2010/main" val="2760506763"/>
+      </p:ext>
+    </p:extLst>
+  </p:cSld>
+  <p:clrMapOvr>
+    <a:masterClrMapping/>
+  </p:clrMapOvr>
+  <mc:AlternateContent xmlns:mc="http://schemas.openxmlformats.org/markup-compatibility/2006" xmlns:p14="http://schemas.microsoft.com/office/powerpoint/2010/main">
+    <mc:Choice Requires="p14">
+      <p:transition spd="med" p14:dur="700">
+        <p:fade/>
+      </p:transition>
+    </mc:Choice>
+    <mc:Fallback xmlns="">
+      <p:transition spd="med">
+        <p:fade/>
+      </p:transition>
+    </mc:Fallback>
+  </mc:AlternateContent>
+</p:sld>
+</file>
+
+<file path=ppt/slides/slide16.xml><?xml version="1.0" encoding="utf-8"?>
+<p:sld xmlns:a="http://schemas.openxmlformats.org/drawingml/2006/main" xmlns:r="http://schemas.openxmlformats.org/officeDocument/2006/relationships" xmlns:p="http://schemas.openxmlformats.org/presentationml/2006/main">
+  <p:cSld>
+    <p:spTree>
+      <p:nvGrpSpPr>
+        <p:cNvPr id="1" name=""/>
+        <p:cNvGrpSpPr/>
+        <p:nvPr/>
+      </p:nvGrpSpPr>
+      <p:grpSpPr>
+        <a:xfrm>
+          <a:off x="0" y="0"/>
+          <a:ext cx="0" cy="0"/>
+          <a:chOff x="0" y="0"/>
+          <a:chExt cx="0" cy="0"/>
+        </a:xfrm>
+      </p:grpSpPr>
+      <p:sp>
+        <p:nvSpPr>
           <p:cNvPr id="3" name="Title 1"/>
           <p:cNvSpPr txBox="1">
             <a:spLocks/>
@@ -8445,7 +8644,7 @@
 </p:sld>
 </file>
 
-<file path=ppt/slides/slide16.xml><?xml version="1.0" encoding="utf-8"?>
+<file path=ppt/slides/slide17.xml><?xml version="1.0" encoding="utf-8"?>
 <p:sld xmlns:a="http://schemas.openxmlformats.org/drawingml/2006/main" xmlns:r="http://schemas.openxmlformats.org/officeDocument/2006/relationships" xmlns:p="http://schemas.openxmlformats.org/presentationml/2006/main">
   <p:cSld>
     <p:spTree>
@@ -9150,7 +9349,7 @@
           <a:graphicData uri="http://schemas.openxmlformats.org/presentationml/2006/ole">
             <mc:AlternateContent xmlns:mc="http://schemas.openxmlformats.org/markup-compatibility/2006">
               <mc:Choice xmlns:v="urn:schemas-microsoft-com:vml" Requires="v">
-                <p:oleObj spid="_x0000_s1139" name="Equation" r:id="rId3" imgW="799920" imgH="1549080" progId="Equation.DSMT4">
+                <p:oleObj spid="_x0000_s1144" name="Equation" r:id="rId3" imgW="799920" imgH="1549080" progId="Equation.DSMT4">
                   <p:embed/>
                 </p:oleObj>
               </mc:Choice>
@@ -9402,7 +9601,7 @@
           <a:graphicData uri="http://schemas.openxmlformats.org/presentationml/2006/ole">
             <mc:AlternateContent xmlns:mc="http://schemas.openxmlformats.org/markup-compatibility/2006">
               <mc:Choice xmlns:v="urn:schemas-microsoft-com:vml" Requires="v">
-                <p:oleObj spid="_x0000_s2163" name="Equation" r:id="rId4" imgW="4241520" imgH="203040" progId="Equation.DSMT4">
+                <p:oleObj spid="_x0000_s2168" name="Equation" r:id="rId4" imgW="4241520" imgH="203040" progId="Equation.DSMT4">
                   <p:embed/>
                 </p:oleObj>
               </mc:Choice>
@@ -10237,7 +10436,7 @@
           <a:graphicData uri="http://schemas.openxmlformats.org/presentationml/2006/ole">
             <mc:AlternateContent xmlns:mc="http://schemas.openxmlformats.org/markup-compatibility/2006">
               <mc:Choice xmlns:v="urn:schemas-microsoft-com:vml" Requires="v">
-                <p:oleObj spid="_x0000_s4612" name="Equation" r:id="rId4" imgW="164880" imgH="177480" progId="Equation.DSMT4">
+                <p:oleObj spid="_x0000_s4652" name="Equation" r:id="rId4" imgW="164880" imgH="177480" progId="Equation.DSMT4">
                   <p:embed/>
                 </p:oleObj>
               </mc:Choice>
@@ -10300,7 +10499,7 @@
           <a:graphicData uri="http://schemas.openxmlformats.org/presentationml/2006/ole">
             <mc:AlternateContent xmlns:mc="http://schemas.openxmlformats.org/markup-compatibility/2006">
               <mc:Choice xmlns:v="urn:schemas-microsoft-com:vml" Requires="v">
-                <p:oleObj spid="_x0000_s4613" name="Equation" r:id="rId6" imgW="431640" imgH="177480" progId="Equation.DSMT4">
+                <p:oleObj spid="_x0000_s4653" name="Equation" r:id="rId6" imgW="431640" imgH="177480" progId="Equation.DSMT4">
                   <p:embed/>
                 </p:oleObj>
               </mc:Choice>
@@ -10363,7 +10562,7 @@
           <a:graphicData uri="http://schemas.openxmlformats.org/presentationml/2006/ole">
             <mc:AlternateContent xmlns:mc="http://schemas.openxmlformats.org/markup-compatibility/2006">
               <mc:Choice xmlns:v="urn:schemas-microsoft-com:vml" Requires="v">
-                <p:oleObj spid="_x0000_s4614" name="Equation" r:id="rId8" imgW="126720" imgH="139680" progId="Equation.DSMT4">
+                <p:oleObj spid="_x0000_s4654" name="Equation" r:id="rId8" imgW="126720" imgH="139680" progId="Equation.DSMT4">
                   <p:embed/>
                 </p:oleObj>
               </mc:Choice>
@@ -10426,7 +10625,7 @@
           <a:graphicData uri="http://schemas.openxmlformats.org/presentationml/2006/ole">
             <mc:AlternateContent xmlns:mc="http://schemas.openxmlformats.org/markup-compatibility/2006">
               <mc:Choice xmlns:v="urn:schemas-microsoft-com:vml" Requires="v">
-                <p:oleObj spid="_x0000_s4615" name="Equation" r:id="rId10" imgW="539750" imgH="343211" progId="Equation.DSMT4">
+                <p:oleObj spid="_x0000_s4655" name="Equation" r:id="rId10" imgW="539750" imgH="343211" progId="Equation.DSMT4">
                   <p:embed/>
                 </p:oleObj>
               </mc:Choice>
@@ -10489,7 +10688,7 @@
           <a:graphicData uri="http://schemas.openxmlformats.org/presentationml/2006/ole">
             <mc:AlternateContent xmlns:mc="http://schemas.openxmlformats.org/markup-compatibility/2006">
               <mc:Choice xmlns:v="urn:schemas-microsoft-com:vml" Requires="v">
-                <p:oleObj spid="_x0000_s4616" name="Equation" r:id="rId12" imgW="833734" imgH="343211" progId="Equation.DSMT4">
+                <p:oleObj spid="_x0000_s4656" name="Equation" r:id="rId12" imgW="833734" imgH="343211" progId="Equation.DSMT4">
                   <p:embed/>
                 </p:oleObj>
               </mc:Choice>
@@ -10552,7 +10751,7 @@
           <a:graphicData uri="http://schemas.openxmlformats.org/presentationml/2006/ole">
             <mc:AlternateContent xmlns:mc="http://schemas.openxmlformats.org/markup-compatibility/2006">
               <mc:Choice xmlns:v="urn:schemas-microsoft-com:vml" Requires="v">
-                <p:oleObj spid="_x0000_s4617" name="Equation" r:id="rId14" imgW="203040" imgH="139680" progId="Equation.DSMT4">
+                <p:oleObj spid="_x0000_s4657" name="Equation" r:id="rId14" imgW="203040" imgH="139680" progId="Equation.DSMT4">
                   <p:embed/>
                 </p:oleObj>
               </mc:Choice>
@@ -10615,7 +10814,7 @@
           <a:graphicData uri="http://schemas.openxmlformats.org/presentationml/2006/ole">
             <mc:AlternateContent xmlns:mc="http://schemas.openxmlformats.org/markup-compatibility/2006">
               <mc:Choice xmlns:v="urn:schemas-microsoft-com:vml" Requires="v">
-                <p:oleObj spid="_x0000_s4618" name="Equation" r:id="rId16" imgW="190440" imgH="177480" progId="Equation.DSMT4">
+                <p:oleObj spid="_x0000_s4658" name="Equation" r:id="rId16" imgW="190440" imgH="177480" progId="Equation.DSMT4">
                   <p:embed/>
                 </p:oleObj>
               </mc:Choice>
@@ -10678,7 +10877,7 @@
           <a:graphicData uri="http://schemas.openxmlformats.org/presentationml/2006/ole">
             <mc:AlternateContent xmlns:mc="http://schemas.openxmlformats.org/markup-compatibility/2006">
               <mc:Choice xmlns:v="urn:schemas-microsoft-com:vml" Requires="v">
-                <p:oleObj spid="_x0000_s4619" name="Equation" r:id="rId18" imgW="833734" imgH="343211" progId="Equation.DSMT4">
+                <p:oleObj spid="_x0000_s4659" name="Equation" r:id="rId18" imgW="833734" imgH="343211" progId="Equation.DSMT4">
                   <p:embed/>
                 </p:oleObj>
               </mc:Choice>

</xml_diff>